<commit_message>
Time Delay Documentation Update
</commit_message>
<xml_diff>
--- a/Assets/Class/Time Delay/PPT Data/Time Delay Example.pptx
+++ b/Assets/Class/Time Delay/PPT Data/Time Delay Example.pptx
@@ -2,8 +2,8 @@
 <file path=ppt/presentation.xml><?xml version="1.0" encoding="utf-8"?>
 <p:presentation xmlns:a="http://schemas.openxmlformats.org/drawingml/2006/main" xmlns:r="http://schemas.openxmlformats.org/officeDocument/2006/relationships" xmlns:p="http://schemas.openxmlformats.org/presentationml/2006/main" xmlns:p14="http://schemas.microsoft.com/office/powerpoint/2010/main" saveSubsetFonts="1" firstSlideNum="0">
   <p:sldMasterIdLst>
-    <p:sldMasterId id="2147485764" r:id="rId23"/>
-    <p:sldMasterId id="2147485765" r:id="rId25"/>
+    <p:sldMasterId id="2147485812" r:id="rId23"/>
+    <p:sldMasterId id="2147485813" r:id="rId25"/>
   </p:sldMasterIdLst>
   <p:notesMasterIdLst>
     <p:notesMasterId r:id="rId27"/>
@@ -17,6 +17,9 @@
     <p:sldId id="297" r:id="rId34"/>
     <p:sldId id="298" r:id="rId35"/>
     <p:sldId id="299" r:id="rId36"/>
+    <p:sldId id="300" r:id="rId37"/>
+    <p:sldId id="301" r:id="rId38"/>
+    <p:sldId id="302" r:id="rId39"/>
   </p:sldIdLst>
   <p:sldSz cx="12192000" cy="6858000"/>
   <p:notesSz cx="6858000" cy="9144000"/>
@@ -617,6 +620,290 @@
 </p:notes>
 </file>
 
+<file path=ppt/notesSlides/notesSlide10.xml><?xml version="1.0" encoding="utf-8"?>
+<p:notes xmlns:a="http://schemas.openxmlformats.org/drawingml/2006/main" xmlns:r="http://schemas.openxmlformats.org/officeDocument/2006/relationships" xmlns:p="http://schemas.openxmlformats.org/presentationml/2006/main">
+  <p:cSld>
+    <p:spTree>
+      <p:nvGrpSpPr>
+        <p:cNvPr id="1" name=""/>
+        <p:cNvGrpSpPr/>
+        <p:nvPr/>
+      </p:nvGrpSpPr>
+      <p:grpSpPr>
+        <a:xfrm>
+          <a:off x="0" y="0"/>
+          <a:ext cx="0" cy="0"/>
+          <a:chOff x="0" y="0"/>
+          <a:chExt cx="0" cy="0"/>
+        </a:xfrm>
+      </p:grpSpPr>
+      <p:sp>
+        <p:nvSpPr>
+          <p:cNvPr id="2" name="슬라이드 이미지 개체 틀 3"/>
+          <p:cNvSpPr>
+            <a:spLocks noChangeAspect="1"/>
+          </p:cNvSpPr>
+          <p:nvPr>
+            <p:ph type="sldImg" idx="2"/>
+          </p:nvPr>
+        </p:nvSpPr>
+        <p:spPr>
+          <a:xfrm rot="0">
+            <a:off x="685800" y="1143000"/>
+            <a:ext cx="5490210" cy="3089910"/>
+          </a:xfrm>
+          <a:prstGeom prst="rect"/>
+          <a:noFill/>
+          <a:ln w="12700" cap="flat" cmpd="sng">
+            <a:solidFill>
+              <a:srgbClr val="000000">
+                <a:alpha val="100000"/>
+              </a:srgbClr>
+            </a:solidFill>
+            <a:prstDash val="solid"/>
+          </a:ln>
+        </p:spPr>
+        <p:txBody>
+          <a:bodyPr wrap="square" lIns="91440" tIns="45720" rIns="91440" bIns="45720" numCol="1" vert="horz" anchor="ctr">
+            <a:noAutofit/>
+          </a:bodyPr>
+          <a:lstStyle/>
+          <a:p>
+            <a:pPr marL="0" indent="0" latinLnBrk="0">
+              <a:buFontTx/>
+              <a:buNone/>
+            </a:pPr>
+          </a:p>
+        </p:txBody>
+      </p:sp>
+      <p:sp>
+        <p:nvSpPr>
+          <p:cNvPr id="3" name="슬라이드 노트 개체 틀 4"/>
+          <p:cNvSpPr txBox="1">
+            <a:spLocks/>
+          </p:cNvSpPr>
+          <p:nvPr>
+            <p:ph type="body" idx="3"/>
+          </p:nvPr>
+        </p:nvSpPr>
+        <p:spPr>
+          <a:xfrm rot="0">
+            <a:off x="685800" y="4400550"/>
+            <a:ext cx="5490210" cy="3604260"/>
+          </a:xfrm>
+          <a:prstGeom prst="rect"/>
+        </p:spPr>
+        <p:txBody>
+          <a:bodyPr wrap="square" lIns="91440" tIns="45720" rIns="91440" bIns="45720" numCol="1" vert="horz" anchor="t">
+            <a:noAutofit/>
+          </a:bodyPr>
+          <a:lstStyle/>
+          <a:p>
+            <a:pPr marL="0" indent="0" latinLnBrk="0">
+              <a:buFontTx/>
+              <a:buNone/>
+            </a:pPr>
+          </a:p>
+        </p:txBody>
+      </p:sp>
+      <p:sp>
+        <p:nvSpPr>
+          <p:cNvPr id="4" name="슬라이드 번호 개체 틀 6"/>
+          <p:cNvSpPr txBox="1">
+            <a:spLocks/>
+          </p:cNvSpPr>
+          <p:nvPr>
+            <p:ph type="sldNum" idx="5"/>
+          </p:nvPr>
+        </p:nvSpPr>
+        <p:spPr>
+          <a:xfrm rot="0">
+            <a:off x="3884930" y="8685530"/>
+            <a:ext cx="2975610" cy="462280"/>
+          </a:xfrm>
+          <a:prstGeom prst="rect"/>
+        </p:spPr>
+        <p:txBody>
+          <a:bodyPr wrap="square" lIns="91440" tIns="45720" rIns="91440" bIns="45720" numCol="1" vert="horz" anchor="b">
+            <a:noAutofit/>
+          </a:bodyPr>
+          <a:lstStyle>
+            <a:lvl1pPr marL="0" indent="0" algn="r" latinLnBrk="0">
+              <a:buFontTx/>
+              <a:buNone/>
+              <a:defRPr lang="en-GB" altLang="en-US" sz="1200"/>
+            </a:lvl1pPr>
+          </a:lstStyle>
+          <a:p>
+            <a:pPr marL="0" indent="0" latinLnBrk="0">
+              <a:buFontTx/>
+              <a:buNone/>
+            </a:pPr>
+            <a:fld id="{B9320F77-B9A0-41C5-862A-B4B631284C64}" type="slidenum">
+              <a:rPr lang="ko-KR" altLang="en-US"/>
+              <a:t>‹#›</a:t>
+            </a:fld>
+          </a:p>
+        </p:txBody>
+      </p:sp>
+    </p:spTree>
+  </p:cSld>
+  <p:clrMapOvr>
+    <a:masterClrMapping/>
+  </p:clrMapOvr>
+  <mc:AlternateContent xmlns:mc="http://schemas.openxmlformats.org/markup-compatibility/2006">
+    <mc:Choice xmlns:p14="http://schemas.microsoft.com/office/powerpoint/2010/main" Requires="p14">
+      <p:transition spd="slow" p14:dur="0"/>
+    </mc:Choice>
+    <mc:Fallback>
+      <p:transition spd="slow"/>
+    </mc:Fallback>
+  </mc:AlternateContent>
+</p:notes>
+</file>
+
+<file path=ppt/notesSlides/notesSlide11.xml><?xml version="1.0" encoding="utf-8"?>
+<p:notes xmlns:a="http://schemas.openxmlformats.org/drawingml/2006/main" xmlns:r="http://schemas.openxmlformats.org/officeDocument/2006/relationships" xmlns:p="http://schemas.openxmlformats.org/presentationml/2006/main">
+  <p:cSld>
+    <p:spTree>
+      <p:nvGrpSpPr>
+        <p:cNvPr id="1" name=""/>
+        <p:cNvGrpSpPr/>
+        <p:nvPr/>
+      </p:nvGrpSpPr>
+      <p:grpSpPr>
+        <a:xfrm>
+          <a:off x="0" y="0"/>
+          <a:ext cx="0" cy="0"/>
+          <a:chOff x="0" y="0"/>
+          <a:chExt cx="0" cy="0"/>
+        </a:xfrm>
+      </p:grpSpPr>
+      <p:sp>
+        <p:nvSpPr>
+          <p:cNvPr id="2" name="슬라이드 이미지 개체 틀 3"/>
+          <p:cNvSpPr>
+            <a:spLocks noChangeAspect="1"/>
+          </p:cNvSpPr>
+          <p:nvPr>
+            <p:ph type="sldImg" idx="2"/>
+          </p:nvPr>
+        </p:nvSpPr>
+        <p:spPr>
+          <a:xfrm rot="0">
+            <a:off x="685800" y="1143000"/>
+            <a:ext cx="5490210" cy="3089910"/>
+          </a:xfrm>
+          <a:prstGeom prst="rect"/>
+          <a:noFill/>
+          <a:ln w="12700" cap="flat" cmpd="sng">
+            <a:solidFill>
+              <a:srgbClr val="000000">
+                <a:alpha val="100000"/>
+              </a:srgbClr>
+            </a:solidFill>
+            <a:prstDash val="solid"/>
+          </a:ln>
+        </p:spPr>
+        <p:txBody>
+          <a:bodyPr wrap="square" lIns="91440" tIns="45720" rIns="91440" bIns="45720" numCol="1" vert="horz" anchor="ctr">
+            <a:noAutofit/>
+          </a:bodyPr>
+          <a:lstStyle/>
+          <a:p>
+            <a:pPr marL="0" indent="0" latinLnBrk="0">
+              <a:buFontTx/>
+              <a:buNone/>
+            </a:pPr>
+          </a:p>
+        </p:txBody>
+      </p:sp>
+      <p:sp>
+        <p:nvSpPr>
+          <p:cNvPr id="3" name="슬라이드 노트 개체 틀 4"/>
+          <p:cNvSpPr txBox="1">
+            <a:spLocks/>
+          </p:cNvSpPr>
+          <p:nvPr>
+            <p:ph type="body" idx="3"/>
+          </p:nvPr>
+        </p:nvSpPr>
+        <p:spPr>
+          <a:xfrm rot="0">
+            <a:off x="685800" y="4400550"/>
+            <a:ext cx="5490210" cy="3604260"/>
+          </a:xfrm>
+          <a:prstGeom prst="rect"/>
+        </p:spPr>
+        <p:txBody>
+          <a:bodyPr wrap="square" lIns="91440" tIns="45720" rIns="91440" bIns="45720" numCol="1" vert="horz" anchor="t">
+            <a:noAutofit/>
+          </a:bodyPr>
+          <a:lstStyle/>
+          <a:p>
+            <a:pPr marL="0" indent="0" latinLnBrk="0">
+              <a:buFontTx/>
+              <a:buNone/>
+            </a:pPr>
+          </a:p>
+        </p:txBody>
+      </p:sp>
+      <p:sp>
+        <p:nvSpPr>
+          <p:cNvPr id="4" name="슬라이드 번호 개체 틀 6"/>
+          <p:cNvSpPr txBox="1">
+            <a:spLocks/>
+          </p:cNvSpPr>
+          <p:nvPr>
+            <p:ph type="sldNum" idx="5"/>
+          </p:nvPr>
+        </p:nvSpPr>
+        <p:spPr>
+          <a:xfrm rot="0">
+            <a:off x="3884930" y="8685530"/>
+            <a:ext cx="2975610" cy="462280"/>
+          </a:xfrm>
+          <a:prstGeom prst="rect"/>
+        </p:spPr>
+        <p:txBody>
+          <a:bodyPr wrap="square" lIns="91440" tIns="45720" rIns="91440" bIns="45720" numCol="1" vert="horz" anchor="b">
+            <a:noAutofit/>
+          </a:bodyPr>
+          <a:lstStyle>
+            <a:lvl1pPr marL="0" indent="0" algn="r" latinLnBrk="0">
+              <a:buFontTx/>
+              <a:buNone/>
+              <a:defRPr lang="en-GB" altLang="en-US" sz="1200"/>
+            </a:lvl1pPr>
+          </a:lstStyle>
+          <a:p>
+            <a:pPr marL="0" indent="0" latinLnBrk="0">
+              <a:buFontTx/>
+              <a:buNone/>
+            </a:pPr>
+            <a:fld id="{B9320F77-B9A0-41C5-862A-B4B631284C64}" type="slidenum">
+              <a:rPr lang="ko-KR" altLang="en-US"/>
+              <a:t>‹#›</a:t>
+            </a:fld>
+          </a:p>
+        </p:txBody>
+      </p:sp>
+    </p:spTree>
+  </p:cSld>
+  <p:clrMapOvr>
+    <a:masterClrMapping/>
+  </p:clrMapOvr>
+  <mc:AlternateContent xmlns:mc="http://schemas.openxmlformats.org/markup-compatibility/2006">
+    <mc:Choice xmlns:p14="http://schemas.microsoft.com/office/powerpoint/2010/main" Requires="p14">
+      <p:transition spd="slow" p14:dur="0"/>
+    </mc:Choice>
+    <mc:Fallback>
+      <p:transition spd="slow"/>
+    </mc:Fallback>
+  </mc:AlternateContent>
+</p:notes>
+</file>
+
 <file path=ppt/notesSlides/notesSlide2.xml><?xml version="1.0" encoding="utf-8"?>
 <p:notes xmlns:a="http://schemas.openxmlformats.org/drawingml/2006/main" xmlns:r="http://schemas.openxmlformats.org/officeDocument/2006/relationships" xmlns:p="http://schemas.openxmlformats.org/presentationml/2006/main">
   <p:cSld>
@@ -1569,6 +1856,148 @@
           <a:xfrm rot="0">
             <a:off x="3884930" y="8685530"/>
             <a:ext cx="2974975" cy="461645"/>
+          </a:xfrm>
+          <a:prstGeom prst="rect"/>
+        </p:spPr>
+        <p:txBody>
+          <a:bodyPr wrap="square" lIns="91440" tIns="45720" rIns="91440" bIns="45720" numCol="1" vert="horz" anchor="b">
+            <a:noAutofit/>
+          </a:bodyPr>
+          <a:lstStyle>
+            <a:lvl1pPr marL="0" indent="0" algn="r" latinLnBrk="0">
+              <a:buFontTx/>
+              <a:buNone/>
+              <a:defRPr lang="en-GB" altLang="en-US" sz="1200"/>
+            </a:lvl1pPr>
+          </a:lstStyle>
+          <a:p>
+            <a:pPr marL="0" indent="0" latinLnBrk="0">
+              <a:buFontTx/>
+              <a:buNone/>
+            </a:pPr>
+            <a:fld id="{B9320F77-B9A0-41C5-862A-B4B631284C64}" type="slidenum">
+              <a:rPr lang="ko-KR" altLang="en-US"/>
+              <a:t>‹#›</a:t>
+            </a:fld>
+          </a:p>
+        </p:txBody>
+      </p:sp>
+    </p:spTree>
+  </p:cSld>
+  <p:clrMapOvr>
+    <a:masterClrMapping/>
+  </p:clrMapOvr>
+  <mc:AlternateContent xmlns:mc="http://schemas.openxmlformats.org/markup-compatibility/2006">
+    <mc:Choice xmlns:p14="http://schemas.microsoft.com/office/powerpoint/2010/main" Requires="p14">
+      <p:transition spd="slow" p14:dur="0"/>
+    </mc:Choice>
+    <mc:Fallback>
+      <p:transition spd="slow"/>
+    </mc:Fallback>
+  </mc:AlternateContent>
+</p:notes>
+</file>
+
+<file path=ppt/notesSlides/notesSlide9.xml><?xml version="1.0" encoding="utf-8"?>
+<p:notes xmlns:a="http://schemas.openxmlformats.org/drawingml/2006/main" xmlns:r="http://schemas.openxmlformats.org/officeDocument/2006/relationships" xmlns:p="http://schemas.openxmlformats.org/presentationml/2006/main">
+  <p:cSld>
+    <p:spTree>
+      <p:nvGrpSpPr>
+        <p:cNvPr id="1" name=""/>
+        <p:cNvGrpSpPr/>
+        <p:nvPr/>
+      </p:nvGrpSpPr>
+      <p:grpSpPr>
+        <a:xfrm>
+          <a:off x="0" y="0"/>
+          <a:ext cx="0" cy="0"/>
+          <a:chOff x="0" y="0"/>
+          <a:chExt cx="0" cy="0"/>
+        </a:xfrm>
+      </p:grpSpPr>
+      <p:sp>
+        <p:nvSpPr>
+          <p:cNvPr id="2" name="슬라이드 이미지 개체 틀 3"/>
+          <p:cNvSpPr>
+            <a:spLocks noChangeAspect="1"/>
+          </p:cNvSpPr>
+          <p:nvPr>
+            <p:ph type="sldImg" idx="2"/>
+          </p:nvPr>
+        </p:nvSpPr>
+        <p:spPr>
+          <a:xfrm rot="0">
+            <a:off x="685800" y="1143000"/>
+            <a:ext cx="5490210" cy="3089910"/>
+          </a:xfrm>
+          <a:prstGeom prst="rect"/>
+          <a:noFill/>
+          <a:ln w="12700" cap="flat" cmpd="sng">
+            <a:solidFill>
+              <a:srgbClr val="000000">
+                <a:alpha val="100000"/>
+              </a:srgbClr>
+            </a:solidFill>
+            <a:prstDash val="solid"/>
+          </a:ln>
+        </p:spPr>
+        <p:txBody>
+          <a:bodyPr wrap="square" lIns="91440" tIns="45720" rIns="91440" bIns="45720" numCol="1" vert="horz" anchor="ctr">
+            <a:noAutofit/>
+          </a:bodyPr>
+          <a:lstStyle/>
+          <a:p>
+            <a:pPr marL="0" indent="0" latinLnBrk="0">
+              <a:buFontTx/>
+              <a:buNone/>
+            </a:pPr>
+          </a:p>
+        </p:txBody>
+      </p:sp>
+      <p:sp>
+        <p:nvSpPr>
+          <p:cNvPr id="3" name="슬라이드 노트 개체 틀 4"/>
+          <p:cNvSpPr txBox="1">
+            <a:spLocks/>
+          </p:cNvSpPr>
+          <p:nvPr>
+            <p:ph type="body" idx="3"/>
+          </p:nvPr>
+        </p:nvSpPr>
+        <p:spPr>
+          <a:xfrm rot="0">
+            <a:off x="685800" y="4400550"/>
+            <a:ext cx="5490210" cy="3604260"/>
+          </a:xfrm>
+          <a:prstGeom prst="rect"/>
+        </p:spPr>
+        <p:txBody>
+          <a:bodyPr wrap="square" lIns="91440" tIns="45720" rIns="91440" bIns="45720" numCol="1" vert="horz" anchor="t">
+            <a:noAutofit/>
+          </a:bodyPr>
+          <a:lstStyle/>
+          <a:p>
+            <a:pPr marL="0" indent="0" latinLnBrk="0">
+              <a:buFontTx/>
+              <a:buNone/>
+            </a:pPr>
+          </a:p>
+        </p:txBody>
+      </p:sp>
+      <p:sp>
+        <p:nvSpPr>
+          <p:cNvPr id="4" name="슬라이드 번호 개체 틀 6"/>
+          <p:cNvSpPr txBox="1">
+            <a:spLocks/>
+          </p:cNvSpPr>
+          <p:nvPr>
+            <p:ph type="sldNum" idx="5"/>
+          </p:nvPr>
+        </p:nvSpPr>
+        <p:spPr>
+          <a:xfrm rot="0">
+            <a:off x="3884930" y="8685530"/>
+            <a:ext cx="2975610" cy="462280"/>
           </a:xfrm>
           <a:prstGeom prst="rect"/>
         </p:spPr>
@@ -9550,7 +9979,7 @@
 </file>
 
 <file path=ppt/slides/slide1.xml><?xml version="1.0" encoding="utf-8"?>
-<p:sld xmlns:a="http://schemas.openxmlformats.org/drawingml/2006/main" xmlns:r="http://schemas.openxmlformats.org/officeDocument/2006/relationships" xmlns:p="http://schemas.openxmlformats.org/presentationml/2006/main">
+<p:sld xmlns:a="http://schemas.openxmlformats.org/drawingml/2006/main" xmlns:r="http://schemas.openxmlformats.org/officeDocument/2006/relationships" xmlns:p="http://schemas.openxmlformats.org/presentationml/2006/main" xmlns:p14="http://schemas.microsoft.com/office/powerpoint/2010/main">
   <p:cSld>
     <p:spTree>
       <p:nvGrpSpPr>
@@ -9720,7 +10149,7 @@
       </p:sp>
       <p:pic>
         <p:nvPicPr>
-          <p:cNvPr id="1033" name="그림 9" descr="C:/Users/Admin1/AppData/Roaming/PolarisOffice/ETemp/17076_14861856/fImage1597828341.png"/>
+          <p:cNvPr id="1033" name="그림 9"/>
           <p:cNvPicPr>
             <a:picLocks noChangeAspect="1"/>
           </p:cNvPicPr>
@@ -9751,7 +10180,7 @@
       </p:pic>
       <p:pic>
         <p:nvPicPr>
-          <p:cNvPr id="1034" name="그림 10" descr="C:/Users/Admin1/AppData/Roaming/PolarisOffice/ETemp/17076_14861856/fImage45612848467.png"/>
+          <p:cNvPr id="1034" name="그림 10"/>
           <p:cNvPicPr>
             <a:picLocks noChangeAspect="1"/>
           </p:cNvPicPr>
@@ -9782,7 +10211,7 @@
       </p:pic>
       <p:pic>
         <p:nvPicPr>
-          <p:cNvPr id="1035" name="그림 13" descr="C:/Users/Admin1/AppData/Roaming/PolarisOffice/ETemp/17076_14861856/fImage20282856334.png"/>
+          <p:cNvPr id="1035" name="그림 13"/>
           <p:cNvPicPr>
             <a:picLocks noChangeAspect="1"/>
           </p:cNvPicPr>
@@ -9913,7 +10342,7 @@
       </p:sp>
       <p:pic>
         <p:nvPicPr>
-          <p:cNvPr id="1038" name="그림 19" descr="C:/Users/Admin1/AppData/Roaming/PolarisOffice/ETemp/17076_14861856/fImage412592896500.png"/>
+          <p:cNvPr id="1038" name="그림 19"/>
           <p:cNvPicPr>
             <a:picLocks noChangeAspect="1"/>
           </p:cNvPicPr>
@@ -9944,7 +10373,7 @@
       </p:pic>
       <p:pic>
         <p:nvPicPr>
-          <p:cNvPr id="1039" name="그림 22" descr="C:/Users/Admin1/AppData/Roaming/PolarisOffice/ETemp/17076_14861856/fImage67922909169.png"/>
+          <p:cNvPr id="1039" name="그림 22"/>
           <p:cNvPicPr>
             <a:picLocks noChangeAspect="1"/>
           </p:cNvPicPr>
@@ -9996,7 +10425,7 @@
 </p:sld>
 </file>
 
-<file path=ppt/slides/slide2.xml><?xml version="1.0" encoding="utf-8"?>
+<file path=ppt/slides/slide10.xml><?xml version="1.0" encoding="utf-8"?>
 <p:sld xmlns:a="http://schemas.openxmlformats.org/drawingml/2006/main" xmlns:r="http://schemas.openxmlformats.org/officeDocument/2006/relationships" xmlns:p="http://schemas.openxmlformats.org/presentationml/2006/main">
   <p:cSld>
     <p:spTree>
@@ -10023,8 +10452,8 @@
         </p:nvSpPr>
         <p:spPr>
           <a:xfrm rot="0">
-            <a:off x="4521200" y="476250"/>
-            <a:ext cx="3150870" cy="554990"/>
+            <a:off x="4523740" y="467360"/>
+            <a:ext cx="3157220" cy="554990"/>
           </a:xfrm>
           <a:prstGeom prst="rect"/>
           <a:noFill/>
@@ -10051,7 +10480,17 @@
                 <a:latin typeface="맑은 고딕" charset="0"/>
                 <a:ea typeface="맑은 고딕" charset="0"/>
               </a:rPr>
-              <a:t>두 번째 튜토리얼</a:t>
+              <a:t>열</a:t>
+            </a:r>
+            <a:r>
+              <a:rPr lang="ko-KR" sz="3000" b="1">
+                <a:solidFill>
+                  <a:schemeClr val="tx1"/>
+                </a:solidFill>
+                <a:latin typeface="맑은 고딕" charset="0"/>
+                <a:ea typeface="맑은 고딕" charset="0"/>
+              </a:rPr>
+              <a:t> 번째 튜토리얼</a:t>
             </a:r>
             <a:endParaRPr lang="ko-KR" altLang="en-US" sz="3000" b="1">
               <a:solidFill>
@@ -10065,7 +10504,7 @@
       </p:sp>
       <p:sp>
         <p:nvSpPr>
-          <p:cNvPr id="1032" name="Rect 0"/>
+          <p:cNvPr id="1053" name="Rect 0"/>
           <p:cNvSpPr txBox="1">
             <a:spLocks/>
           </p:cNvSpPr>
@@ -10073,8 +10512,8 @@
         </p:nvSpPr>
         <p:spPr>
           <a:xfrm rot="0">
-            <a:off x="1366520" y="4399280"/>
-            <a:ext cx="4013835" cy="1784985"/>
+            <a:off x="1412240" y="4532630"/>
+            <a:ext cx="3987165" cy="1784985"/>
           </a:xfrm>
           <a:prstGeom prst="rect"/>
           <a:noFill/>
@@ -10084,7 +10523,7 @@
           </a:ln>
         </p:spPr>
         <p:txBody>
-          <a:bodyPr wrap="square" lIns="89535" tIns="46355" rIns="89535" bIns="46355" vert="horz" anchor="t">
+          <a:bodyPr wrap="square" lIns="89535" tIns="46355" rIns="89535" bIns="46355" numCol="1" vert="horz" anchor="t">
             <a:spAutoFit/>
           </a:bodyPr>
           <a:lstStyle/>
@@ -10093,6 +10532,26 @@
               <a:buFontTx/>
               <a:buNone/>
             </a:pPr>
+            <a:r>
+              <a:rPr lang="ko-KR" sz="2000" b="1">
+                <a:solidFill>
+                  <a:srgbClr val="0611F2"/>
+                </a:solidFill>
+                <a:latin typeface="맑은 고딕" charset="0"/>
+                <a:ea typeface="맑은 고딕" charset="0"/>
+              </a:rPr>
+              <a:t>1</a:t>
+            </a:r>
+            <a:r>
+              <a:rPr lang="ko-KR" sz="2000" b="1">
+                <a:solidFill>
+                  <a:srgbClr val="0611F2"/>
+                </a:solidFill>
+                <a:latin typeface="맑은 고딕" charset="0"/>
+                <a:ea typeface="맑은 고딕" charset="0"/>
+              </a:rPr>
+              <a:t>8</a:t>
+            </a:r>
             <a:r>
               <a:rPr sz="2000" b="1">
                 <a:solidFill>
@@ -10101,16 +10560,6 @@
                 <a:latin typeface="맑은 고딕" charset="0"/>
                 <a:ea typeface="맑은 고딕" charset="0"/>
               </a:rPr>
-              <a:t>3</a:t>
-            </a:r>
-            <a:r>
-              <a:rPr sz="2000" b="1">
-                <a:solidFill>
-                  <a:srgbClr val="0611F2"/>
-                </a:solidFill>
-                <a:latin typeface="맑은 고딕" charset="0"/>
-                <a:ea typeface="맑은 고딕" charset="0"/>
-              </a:rPr>
               <a:t>. </a:t>
             </a:r>
             <a:r>
@@ -10118,7 +10567,7 @@
                 <a:latin typeface="맑은 고딕" charset="0"/>
                 <a:ea typeface="맑은 고딕" charset="0"/>
               </a:rPr>
-              <a:t>그리고 Capsule 오브젝트를 선택한 다음 UI에서 Image를 생성합니다.</a:t>
+              <a:t>이제 Switching 스크립트를 선택합니다.</a:t>
             </a:r>
             <a:endParaRPr lang="ko-KR" altLang="en-US" sz="1800">
               <a:latin typeface="맑은 고딕" charset="0"/>
@@ -10145,7 +10594,7 @@
                 <a:latin typeface="맑은 고딕" charset="0"/>
                 <a:ea typeface="맑은 고딕" charset="0"/>
               </a:rPr>
-              <a:t>그다음 State라는 이름으로 정의합니다.</a:t>
+              <a:t>그리고 Image 변수와 Sprite 변수를 선언한 다음 boolean 변수를 선언합니다.</a:t>
             </a:r>
             <a:endParaRPr lang="ko-KR" altLang="en-US" sz="1800">
               <a:latin typeface="맑은 고딕" charset="0"/>
@@ -10156,7 +10605,7 @@
       </p:sp>
       <p:sp>
         <p:nvSpPr>
-          <p:cNvPr id="1037" name="Rect 0"/>
+          <p:cNvPr id="1061" name="Rect 0"/>
           <p:cNvSpPr txBox="1">
             <a:spLocks/>
           </p:cNvSpPr>
@@ -10164,8 +10613,8 @@
         </p:nvSpPr>
         <p:spPr>
           <a:xfrm rot="0">
-            <a:off x="6821805" y="4671695"/>
-            <a:ext cx="4094480" cy="1508125"/>
+            <a:off x="6809105" y="3698875"/>
+            <a:ext cx="4105910" cy="2615565"/>
           </a:xfrm>
           <a:prstGeom prst="rect"/>
           <a:noFill/>
@@ -10175,7 +10624,7 @@
           </a:ln>
         </p:spPr>
         <p:txBody>
-          <a:bodyPr wrap="square" lIns="89535" tIns="46355" rIns="89535" bIns="46355" vert="horz" anchor="t">
+          <a:bodyPr wrap="square" lIns="89535" tIns="46355" rIns="89535" bIns="46355" numCol="1" vert="horz" anchor="t">
             <a:spAutoFit/>
           </a:bodyPr>
           <a:lstStyle/>
@@ -10192,7 +10641,17 @@
                 <a:latin typeface="맑은 고딕" charset="0"/>
                 <a:ea typeface="맑은 고딕" charset="0"/>
               </a:rPr>
-              <a:t>4</a:t>
+              <a:t>1</a:t>
+            </a:r>
+            <a:r>
+              <a:rPr lang="ko-KR" sz="2000" b="1">
+                <a:solidFill>
+                  <a:srgbClr val="0611F2"/>
+                </a:solidFill>
+                <a:latin typeface="맑은 고딕" charset="0"/>
+                <a:ea typeface="맑은 고딕" charset="0"/>
+              </a:rPr>
+              <a:t>9</a:t>
             </a:r>
             <a:r>
               <a:rPr sz="2000" b="1">
@@ -10209,7 +10668,7 @@
                 <a:latin typeface="맑은 고딕" charset="0"/>
                 <a:ea typeface="맑은 고딕" charset="0"/>
               </a:rPr>
-              <a:t>이제 Canvas의 크기와 위치를 설정합니다.</a:t>
+              <a:t>그런 다음 Behaviour( ) 함수를 선언합니다.</a:t>
             </a:r>
             <a:endParaRPr lang="ko-KR" altLang="en-US" sz="1800">
               <a:latin typeface="맑은 고딕" charset="0"/>
@@ -10236,18 +10695,946 @@
                 <a:latin typeface="맑은 고딕" charset="0"/>
                 <a:ea typeface="맑은 고딕" charset="0"/>
               </a:rPr>
-              <a:t>그런 다음 Render Mode를 World Space로 변경합니다.</a:t>
+              <a:t>그다음 조건문으로 state 변수가 true이면 Time.timeScale을 0으로 설정합니다.</a:t>
             </a:r>
             <a:endParaRPr lang="ko-KR" altLang="en-US" sz="1800">
               <a:latin typeface="맑은 고딕" charset="0"/>
               <a:ea typeface="맑은 고딕" charset="0"/>
             </a:endParaRPr>
           </a:p>
+          <a:p>
+            <a:pPr marL="0" indent="0" rtl="0" algn="l" defTabSz="914400" eaLnBrk="1" latinLnBrk="0" hangingPunct="1">
+              <a:buFontTx/>
+              <a:buNone/>
+            </a:pPr>
+            <a:endParaRPr lang="ko-KR" altLang="en-US" sz="1800">
+              <a:latin typeface="맑은 고딕" charset="0"/>
+              <a:ea typeface="맑은 고딕" charset="0"/>
+            </a:endParaRPr>
+          </a:p>
+          <a:p>
+            <a:pPr marL="0" indent="0" rtl="0" algn="l" defTabSz="914400" eaLnBrk="1" latinLnBrk="0" hangingPunct="1">
+              <a:buFontTx/>
+              <a:buNone/>
+            </a:pPr>
+            <a:r>
+              <a:rPr lang="ko-KR" sz="1800">
+                <a:latin typeface="맑은 고딕" charset="0"/>
+                <a:ea typeface="맑은 고딕" charset="0"/>
+              </a:rPr>
+              <a:t>그리고 state 변수가 false이면 Time.timeScale을 1로 설정합니다.</a:t>
+            </a:r>
+            <a:endParaRPr lang="ko-KR" altLang="en-US" sz="1800">
+              <a:latin typeface="맑은 고딕" charset="0"/>
+              <a:ea typeface="맑은 고딕" charset="0"/>
+            </a:endParaRPr>
+          </a:p>
         </p:txBody>
       </p:sp>
       <p:pic>
         <p:nvPicPr>
-          <p:cNvPr id="1040" name="그림 26" descr="C:/Users/Admin1/AppData/Roaming/PolarisOffice/ETemp/17076_14861856/fImage185003055724.png"/>
+          <p:cNvPr id="1070" name="그림 21" descr="C:/Users/Admin1/AppData/Roaming/PolarisOffice/ETemp/18200_22907784/fImage75233095724.png"/>
+          <p:cNvPicPr>
+            <a:picLocks noChangeAspect="1"/>
+          </p:cNvPicPr>
+          <p:nvPr/>
+        </p:nvPicPr>
+        <p:blipFill rotWithShape="1">
+          <a:blip r:embed="rId2" cstate="print">
+            <a:extLst>
+              <a:ext uri="{28A0092B-C50C-407E-A947-70E740481C1C}">
+                <a14:useLocalDpi xmlns:a14="http://schemas.microsoft.com/office/drawing/2010/main" val="0"/>
+              </a:ext>
+            </a:extLst>
+          </a:blip>
+          <a:stretch>
+            <a:fillRect/>
+          </a:stretch>
+        </p:blipFill>
+        <p:spPr>
+          <a:xfrm rot="0">
+            <a:off x="1388745" y="1499870"/>
+            <a:ext cx="4001135" cy="2946400"/>
+          </a:xfrm>
+          <a:prstGeom prst="roundRect"/>
+          <a:solidFill>
+            <a:srgbClr val="EDEDED"/>
+          </a:solidFill>
+        </p:spPr>
+      </p:pic>
+      <p:pic>
+        <p:nvPicPr>
+          <p:cNvPr id="1071" name="그림 28" descr="C:/Users/Admin1/AppData/Roaming/PolarisOffice/ETemp/18200_22907784/fImage66683101478.png"/>
+          <p:cNvPicPr>
+            <a:picLocks noChangeAspect="1"/>
+          </p:cNvPicPr>
+          <p:nvPr/>
+        </p:nvPicPr>
+        <p:blipFill rotWithShape="1">
+          <a:blip r:embed="rId3" cstate="print">
+            <a:extLst>
+              <a:ext uri="{28A0092B-C50C-407E-A947-70E740481C1C}">
+                <a14:useLocalDpi xmlns:a14="http://schemas.microsoft.com/office/drawing/2010/main" val="0"/>
+              </a:ext>
+            </a:extLst>
+          </a:blip>
+          <a:stretch>
+            <a:fillRect/>
+          </a:stretch>
+        </p:blipFill>
+        <p:spPr>
+          <a:xfrm rot="0">
+            <a:off x="6814185" y="1490980"/>
+            <a:ext cx="4101465" cy="2133600"/>
+          </a:xfrm>
+          <a:prstGeom prst="rect"/>
+          <a:noFill/>
+        </p:spPr>
+      </p:pic>
+    </p:spTree>
+  </p:cSld>
+  <p:clrMapOvr>
+    <a:masterClrMapping/>
+  </p:clrMapOvr>
+  <mc:AlternateContent xmlns:mc="http://schemas.openxmlformats.org/markup-compatibility/2006">
+    <mc:Choice xmlns:p14="http://schemas.microsoft.com/office/powerpoint/2010/main" Requires="p14">
+      <p:transition spd="slow" p14:dur="2000"/>
+    </mc:Choice>
+    <mc:Fallback>
+      <p:transition spd="slow"/>
+    </mc:Fallback>
+  </mc:AlternateContent>
+  <p:timing>
+    <p:tnLst>
+      <p:par>
+        <p:cTn id="1" dur="indefinite" restart="never" nodeType="tmRoot"/>
+      </p:par>
+    </p:tnLst>
+  </p:timing>
+</p:sld>
+</file>
+
+<file path=ppt/slides/slide11.xml><?xml version="1.0" encoding="utf-8"?>
+<p:sld xmlns:a="http://schemas.openxmlformats.org/drawingml/2006/main" xmlns:r="http://schemas.openxmlformats.org/officeDocument/2006/relationships" xmlns:p="http://schemas.openxmlformats.org/presentationml/2006/main">
+  <p:cSld>
+    <p:spTree>
+      <p:nvGrpSpPr>
+        <p:cNvPr id="1" name=""/>
+        <p:cNvGrpSpPr/>
+        <p:nvPr/>
+      </p:nvGrpSpPr>
+      <p:grpSpPr>
+        <a:xfrm>
+          <a:off x="0" y="0"/>
+          <a:ext cx="0" cy="0"/>
+          <a:chOff x="0" y="0"/>
+          <a:chExt cx="0" cy="0"/>
+        </a:xfrm>
+      </p:grpSpPr>
+      <p:sp>
+        <p:nvSpPr>
+          <p:cNvPr id="1031" name="Rect 0"/>
+          <p:cNvSpPr txBox="1">
+            <a:spLocks/>
+          </p:cNvSpPr>
+          <p:nvPr/>
+        </p:nvSpPr>
+        <p:spPr>
+          <a:xfrm rot="0">
+            <a:off x="4354195" y="467360"/>
+            <a:ext cx="3498850" cy="554990"/>
+          </a:xfrm>
+          <a:prstGeom prst="rect"/>
+          <a:noFill/>
+          <a:ln w="0">
+            <a:noFill/>
+            <a:prstDash/>
+          </a:ln>
+        </p:spPr>
+        <p:txBody>
+          <a:bodyPr wrap="square" lIns="89535" tIns="46355" rIns="89535" bIns="46355" numCol="1" vert="horz" anchor="t">
+            <a:spAutoFit/>
+          </a:bodyPr>
+          <a:lstStyle/>
+          <a:p>
+            <a:pPr marL="0" indent="0" algn="l" latinLnBrk="0">
+              <a:buFontTx/>
+              <a:buNone/>
+            </a:pPr>
+            <a:r>
+              <a:rPr lang="ko-KR" sz="3000" b="1">
+                <a:solidFill>
+                  <a:schemeClr val="tx1"/>
+                </a:solidFill>
+                <a:latin typeface="맑은 고딕" charset="0"/>
+                <a:ea typeface="맑은 고딕" charset="0"/>
+              </a:rPr>
+              <a:t>열한</a:t>
+            </a:r>
+            <a:r>
+              <a:rPr lang="ko-KR" sz="3000" b="1">
+                <a:solidFill>
+                  <a:schemeClr val="tx1"/>
+                </a:solidFill>
+                <a:latin typeface="맑은 고딕" charset="0"/>
+                <a:ea typeface="맑은 고딕" charset="0"/>
+              </a:rPr>
+              <a:t> 번째 튜토리얼</a:t>
+            </a:r>
+            <a:endParaRPr lang="ko-KR" altLang="en-US" sz="3000" b="1">
+              <a:solidFill>
+                <a:schemeClr val="tx1"/>
+              </a:solidFill>
+              <a:latin typeface="맑은 고딕" charset="0"/>
+              <a:ea typeface="맑은 고딕" charset="0"/>
+            </a:endParaRPr>
+          </a:p>
+        </p:txBody>
+      </p:sp>
+      <p:sp>
+        <p:nvSpPr>
+          <p:cNvPr id="1053" name="Rect 0"/>
+          <p:cNvSpPr txBox="1">
+            <a:spLocks/>
+          </p:cNvSpPr>
+          <p:nvPr/>
+        </p:nvSpPr>
+        <p:spPr>
+          <a:xfrm rot="0">
+            <a:off x="1290955" y="4255770"/>
+            <a:ext cx="4117340" cy="2061845"/>
+          </a:xfrm>
+          <a:prstGeom prst="rect"/>
+          <a:noFill/>
+          <a:ln w="0">
+            <a:noFill/>
+            <a:prstDash/>
+          </a:ln>
+        </p:spPr>
+        <p:txBody>
+          <a:bodyPr wrap="square" lIns="89535" tIns="46355" rIns="89535" bIns="46355" numCol="1" vert="horz" anchor="t">
+            <a:spAutoFit/>
+          </a:bodyPr>
+          <a:lstStyle/>
+          <a:p>
+            <a:pPr marL="0" indent="0" rtl="0" algn="l" defTabSz="914400" eaLnBrk="1" latinLnBrk="0" hangingPunct="1">
+              <a:buFontTx/>
+              <a:buNone/>
+            </a:pPr>
+            <a:r>
+              <a:rPr lang="ko-KR" sz="2000" b="1">
+                <a:solidFill>
+                  <a:srgbClr val="0611F2"/>
+                </a:solidFill>
+                <a:latin typeface="맑은 고딕" charset="0"/>
+                <a:ea typeface="맑은 고딕" charset="0"/>
+              </a:rPr>
+              <a:t>20</a:t>
+            </a:r>
+            <a:r>
+              <a:rPr sz="2000" b="1">
+                <a:solidFill>
+                  <a:srgbClr val="0611F2"/>
+                </a:solidFill>
+                <a:latin typeface="맑은 고딕" charset="0"/>
+                <a:ea typeface="맑은 고딕" charset="0"/>
+              </a:rPr>
+              <a:t>. </a:t>
+            </a:r>
+            <a:r>
+              <a:rPr lang="ko-KR" sz="1800">
+                <a:latin typeface="맑은 고딕" charset="0"/>
+                <a:ea typeface="맑은 고딕" charset="0"/>
+              </a:rPr>
+              <a:t>이제 Switching 스크립트를 선택하고 Project 폴더에 있는 Texture 폴더에 Pause 텍스처와 Play 텍스처를 넣어줍니다.</a:t>
+            </a:r>
+            <a:endParaRPr lang="ko-KR" altLang="en-US" sz="1800">
+              <a:latin typeface="맑은 고딕" charset="0"/>
+              <a:ea typeface="맑은 고딕" charset="0"/>
+            </a:endParaRPr>
+          </a:p>
+          <a:p>
+            <a:pPr marL="0" indent="0" rtl="0" algn="l" defTabSz="914400" eaLnBrk="1" latinLnBrk="0" hangingPunct="1">
+              <a:buFontTx/>
+              <a:buNone/>
+            </a:pPr>
+            <a:endParaRPr lang="ko-KR" altLang="en-US" sz="1800">
+              <a:latin typeface="맑은 고딕" charset="0"/>
+              <a:ea typeface="맑은 고딕" charset="0"/>
+            </a:endParaRPr>
+          </a:p>
+          <a:p>
+            <a:pPr marL="0" indent="0" rtl="0" algn="l" defTabSz="914400" eaLnBrk="1" latinLnBrk="0" hangingPunct="1">
+              <a:buFontTx/>
+              <a:buNone/>
+            </a:pPr>
+            <a:r>
+              <a:rPr lang="ko-KR" sz="1800">
+                <a:latin typeface="맑은 고딕" charset="0"/>
+                <a:ea typeface="맑은 고딕" charset="0"/>
+              </a:rPr>
+              <a:t>그다음 Pause Button 오브젝트를 선택하고 Button Image에 넣어줍니다.</a:t>
+            </a:r>
+            <a:endParaRPr lang="ko-KR" altLang="en-US" sz="1800">
+              <a:latin typeface="맑은 고딕" charset="0"/>
+              <a:ea typeface="맑은 고딕" charset="0"/>
+            </a:endParaRPr>
+          </a:p>
+        </p:txBody>
+      </p:sp>
+      <p:pic>
+        <p:nvPicPr>
+          <p:cNvPr id="1072" name="그림 30" descr="C:/Users/Admin1/AppData/Roaming/PolarisOffice/ETemp/18200_22907784/fImage149833199358.png"/>
+          <p:cNvPicPr>
+            <a:picLocks noChangeAspect="1"/>
+          </p:cNvPicPr>
+          <p:nvPr/>
+        </p:nvPicPr>
+        <p:blipFill rotWithShape="1">
+          <a:blip r:embed="rId2" cstate="print">
+            <a:extLst>
+              <a:ext uri="{28A0092B-C50C-407E-A947-70E740481C1C}">
+                <a14:useLocalDpi xmlns:a14="http://schemas.microsoft.com/office/drawing/2010/main" val="0"/>
+              </a:ext>
+            </a:extLst>
+          </a:blip>
+          <a:stretch>
+            <a:fillRect/>
+          </a:stretch>
+        </p:blipFill>
+        <p:spPr>
+          <a:xfrm rot="0">
+            <a:off x="1282065" y="1481455"/>
+            <a:ext cx="4126865" cy="1535430"/>
+          </a:xfrm>
+          <a:prstGeom prst="roundRect"/>
+          <a:solidFill>
+            <a:srgbClr val="EDEDED"/>
+          </a:solidFill>
+        </p:spPr>
+      </p:pic>
+      <p:pic>
+        <p:nvPicPr>
+          <p:cNvPr id="1073" name="그림 33" descr="C:/Users/Admin1/AppData/Roaming/PolarisOffice/ETemp/18200_22907784/fImage331733206962.png"/>
+          <p:cNvPicPr>
+            <a:picLocks noChangeAspect="1"/>
+          </p:cNvPicPr>
+          <p:nvPr/>
+        </p:nvPicPr>
+        <p:blipFill rotWithShape="1">
+          <a:blip r:embed="rId3" cstate="print">
+            <a:extLst>
+              <a:ext uri="{28A0092B-C50C-407E-A947-70E740481C1C}">
+                <a14:useLocalDpi xmlns:a14="http://schemas.microsoft.com/office/drawing/2010/main" val="0"/>
+              </a:ext>
+            </a:extLst>
+          </a:blip>
+          <a:stretch>
+            <a:fillRect/>
+          </a:stretch>
+        </p:blipFill>
+        <p:spPr>
+          <a:xfrm rot="0">
+            <a:off x="2623820" y="3218180"/>
+            <a:ext cx="2772410" cy="930275"/>
+          </a:xfrm>
+          <a:prstGeom prst="roundRect"/>
+          <a:solidFill>
+            <a:srgbClr val="EDEDED"/>
+          </a:solidFill>
+        </p:spPr>
+      </p:pic>
+      <p:cxnSp>
+        <p:nvCxnSpPr>
+          <p:cNvPr id="1074" name="도형 36"/>
+          <p:cNvCxnSpPr/>
+          <p:nvPr/>
+        </p:nvCxnSpPr>
+        <p:spPr>
+          <a:xfrm rot="0" flipV="1">
+            <a:off x="3680460" y="2693035"/>
+            <a:ext cx="1654810" cy="736600"/>
+          </a:xfrm>
+          <a:prstGeom prst="straightConnector1"/>
+          <a:ln w="6350" cap="flat" cmpd="sng">
+            <a:prstDash/>
+            <a:headEnd type="none" w="med" len="med"/>
+            <a:tailEnd type="triangle" w="med" len="med"/>
+          </a:ln>
+        </p:spPr>
+        <p:style>
+          <a:lnRef idx="1">
+            <a:schemeClr val="accent1"/>
+          </a:lnRef>
+          <a:fillRef idx="0">
+            <a:schemeClr val="accent1"/>
+          </a:fillRef>
+          <a:effectRef idx="0">
+            <a:schemeClr val="accent1"/>
+          </a:effectRef>
+          <a:fontRef idx="minor">
+            <a:schemeClr val="tx1"/>
+          </a:fontRef>
+        </p:style>
+      </p:cxnSp>
+      <p:cxnSp>
+        <p:nvCxnSpPr>
+          <p:cNvPr id="1075" name="도형 37"/>
+          <p:cNvCxnSpPr/>
+          <p:nvPr/>
+        </p:nvCxnSpPr>
+        <p:spPr>
+          <a:xfrm rot="0" flipV="1">
+            <a:off x="4277995" y="2519680"/>
+            <a:ext cx="1039495" cy="918845"/>
+          </a:xfrm>
+          <a:prstGeom prst="straightConnector1"/>
+          <a:ln w="6350" cap="flat" cmpd="sng">
+            <a:prstDash/>
+            <a:headEnd type="none" w="med" len="med"/>
+            <a:tailEnd type="triangle" w="med" len="med"/>
+          </a:ln>
+        </p:spPr>
+        <p:style>
+          <a:lnRef idx="1">
+            <a:schemeClr val="accent1"/>
+          </a:lnRef>
+          <a:fillRef idx="0">
+            <a:schemeClr val="accent1"/>
+          </a:fillRef>
+          <a:effectRef idx="0">
+            <a:schemeClr val="accent1"/>
+          </a:effectRef>
+          <a:fontRef idx="minor">
+            <a:schemeClr val="tx1"/>
+          </a:fontRef>
+        </p:style>
+      </p:cxnSp>
+      <p:pic>
+        <p:nvPicPr>
+          <p:cNvPr id="1076" name="그림 38" descr="C:/Users/Admin1/AppData/Roaming/PolarisOffice/ETemp/18200_22907784/fImage64693234464.png"/>
+          <p:cNvPicPr>
+            <a:picLocks noChangeAspect="1"/>
+          </p:cNvPicPr>
+          <p:nvPr/>
+        </p:nvPicPr>
+        <p:blipFill rotWithShape="1">
+          <a:blip r:embed="rId4" cstate="print">
+            <a:extLst>
+              <a:ext uri="{28A0092B-C50C-407E-A947-70E740481C1C}">
+                <a14:useLocalDpi xmlns:a14="http://schemas.microsoft.com/office/drawing/2010/main" val="0"/>
+              </a:ext>
+            </a:extLst>
+          </a:blip>
+          <a:stretch>
+            <a:fillRect/>
+          </a:stretch>
+        </p:blipFill>
+        <p:spPr>
+          <a:xfrm rot="0">
+            <a:off x="1282065" y="3257550"/>
+            <a:ext cx="1238885" cy="884555"/>
+          </a:xfrm>
+          <a:prstGeom prst="roundRect"/>
+          <a:solidFill>
+            <a:srgbClr val="EDEDED"/>
+          </a:solidFill>
+        </p:spPr>
+      </p:pic>
+      <p:cxnSp>
+        <p:nvCxnSpPr>
+          <p:cNvPr id="1077" name="도형 41"/>
+          <p:cNvCxnSpPr/>
+          <p:nvPr/>
+        </p:nvCxnSpPr>
+        <p:spPr>
+          <a:xfrm rot="0" flipV="1">
+            <a:off x="2312035" y="1983105"/>
+            <a:ext cx="3014345" cy="1939925"/>
+          </a:xfrm>
+          <a:prstGeom prst="straightConnector1"/>
+          <a:ln w="6350" cap="flat" cmpd="sng">
+            <a:prstDash/>
+            <a:headEnd type="none" w="med" len="med"/>
+            <a:tailEnd type="triangle" w="med" len="med"/>
+          </a:ln>
+        </p:spPr>
+        <p:style>
+          <a:lnRef idx="1">
+            <a:schemeClr val="accent1"/>
+          </a:lnRef>
+          <a:fillRef idx="0">
+            <a:schemeClr val="accent1"/>
+          </a:fillRef>
+          <a:effectRef idx="0">
+            <a:schemeClr val="accent1"/>
+          </a:effectRef>
+          <a:fontRef idx="minor">
+            <a:schemeClr val="tx1"/>
+          </a:fontRef>
+        </p:style>
+      </p:cxnSp>
+      <p:pic>
+        <p:nvPicPr>
+          <p:cNvPr id="1078" name="그림 42" descr="C:/Users/Admin1/AppData/Roaming/PolarisOffice/ETemp/18200_22907784/fImage70263255705.png"/>
+          <p:cNvPicPr>
+            <a:picLocks noChangeAspect="1"/>
+          </p:cNvPicPr>
+          <p:nvPr/>
+        </p:nvPicPr>
+        <p:blipFill rotWithShape="1">
+          <a:blip r:embed="rId5" cstate="print">
+            <a:extLst>
+              <a:ext uri="{28A0092B-C50C-407E-A947-70E740481C1C}">
+                <a14:useLocalDpi xmlns:a14="http://schemas.microsoft.com/office/drawing/2010/main" val="0"/>
+              </a:ext>
+            </a:extLst>
+          </a:blip>
+          <a:stretch>
+            <a:fillRect/>
+          </a:stretch>
+        </p:blipFill>
+        <p:spPr>
+          <a:xfrm rot="0">
+            <a:off x="6838950" y="1476375"/>
+            <a:ext cx="4144010" cy="1019810"/>
+          </a:xfrm>
+          <a:prstGeom prst="roundRect"/>
+          <a:solidFill>
+            <a:srgbClr val="EDEDED"/>
+          </a:solidFill>
+        </p:spPr>
+      </p:pic>
+      <p:pic>
+        <p:nvPicPr>
+          <p:cNvPr id="1079" name="그림 45" descr="C:/Users/Admin1/AppData/Roaming/PolarisOffice/ETemp/18200_22907784/fImage64693268145.png"/>
+          <p:cNvPicPr>
+            <a:picLocks noChangeAspect="1"/>
+          </p:cNvPicPr>
+          <p:nvPr/>
+        </p:nvPicPr>
+        <p:blipFill rotWithShape="1">
+          <a:blip r:embed="rId6" cstate="print">
+            <a:extLst>
+              <a:ext uri="{28A0092B-C50C-407E-A947-70E740481C1C}">
+                <a14:useLocalDpi xmlns:a14="http://schemas.microsoft.com/office/drawing/2010/main" val="0"/>
+              </a:ext>
+            </a:extLst>
+          </a:blip>
+          <a:stretch>
+            <a:fillRect/>
+          </a:stretch>
+        </p:blipFill>
+        <p:spPr>
+          <a:xfrm rot="0">
+            <a:off x="6840220" y="2643505"/>
+            <a:ext cx="4133215" cy="1786255"/>
+          </a:xfrm>
+          <a:prstGeom prst="roundRect"/>
+          <a:solidFill>
+            <a:srgbClr val="EDEDED"/>
+          </a:solidFill>
+        </p:spPr>
+      </p:pic>
+      <p:sp>
+        <p:nvSpPr>
+          <p:cNvPr id="1080" name="텍스트 상자 48"/>
+          <p:cNvSpPr txBox="1">
+            <a:spLocks/>
+          </p:cNvSpPr>
+          <p:nvPr/>
+        </p:nvSpPr>
+        <p:spPr>
+          <a:xfrm rot="0">
+            <a:off x="6849110" y="4527550"/>
+            <a:ext cx="4117340" cy="1784985"/>
+          </a:xfrm>
+          <a:prstGeom prst="rect"/>
+          <a:noFill/>
+          <a:ln w="0">
+            <a:noFill/>
+            <a:prstDash/>
+          </a:ln>
+        </p:spPr>
+        <p:txBody>
+          <a:bodyPr wrap="square" lIns="89535" tIns="46355" rIns="89535" bIns="46355" numCol="1" vert="horz" anchor="t">
+            <a:spAutoFit/>
+          </a:bodyPr>
+          <a:lstStyle/>
+          <a:p>
+            <a:pPr marL="0" indent="0" rtl="0" algn="l" defTabSz="914400" eaLnBrk="1" latinLnBrk="0" hangingPunct="1">
+              <a:buFontTx/>
+              <a:buNone/>
+            </a:pPr>
+            <a:r>
+              <a:rPr lang="ko-KR" sz="2000" b="1">
+                <a:solidFill>
+                  <a:srgbClr val="0611F2"/>
+                </a:solidFill>
+                <a:latin typeface="맑은 고딕" charset="0"/>
+                <a:ea typeface="맑은 고딕" charset="0"/>
+              </a:rPr>
+              <a:t>21</a:t>
+            </a:r>
+            <a:r>
+              <a:rPr sz="2000" b="1">
+                <a:solidFill>
+                  <a:srgbClr val="0611F2"/>
+                </a:solidFill>
+                <a:latin typeface="맑은 고딕" charset="0"/>
+                <a:ea typeface="맑은 고딕" charset="0"/>
+              </a:rPr>
+              <a:t>. </a:t>
+            </a:r>
+            <a:r>
+              <a:rPr lang="ko-KR" sz="1800">
+                <a:latin typeface="맑은 고딕" charset="0"/>
+                <a:ea typeface="맑은 고딕" charset="0"/>
+              </a:rPr>
+              <a:t>그런 다음 Pause Button에 On Click( ) 함수를 추가합니다.</a:t>
+            </a:r>
+            <a:endParaRPr lang="ko-KR" altLang="en-US" sz="1800">
+              <a:latin typeface="맑은 고딕" charset="0"/>
+              <a:ea typeface="맑은 고딕" charset="0"/>
+            </a:endParaRPr>
+          </a:p>
+          <a:p>
+            <a:pPr marL="0" indent="0" rtl="0" algn="l" defTabSz="914400" eaLnBrk="1" latinLnBrk="0" hangingPunct="1">
+              <a:buFontTx/>
+              <a:buNone/>
+            </a:pPr>
+            <a:endParaRPr lang="ko-KR" altLang="en-US" sz="1800">
+              <a:latin typeface="맑은 고딕" charset="0"/>
+              <a:ea typeface="맑은 고딕" charset="0"/>
+            </a:endParaRPr>
+          </a:p>
+          <a:p>
+            <a:pPr marL="0" indent="0" rtl="0" algn="l" defTabSz="914400" eaLnBrk="1" latinLnBrk="0" hangingPunct="1">
+              <a:buFontTx/>
+              <a:buNone/>
+            </a:pPr>
+            <a:r>
+              <a:rPr lang="ko-KR" sz="1800">
+                <a:latin typeface="맑은 고딕" charset="0"/>
+                <a:ea typeface="맑은 고딕" charset="0"/>
+              </a:rPr>
+              <a:t>그리고 On Click( ) 함수에 자신의 오브젝트를 넣어주고 Behaviour( ) 함수를 설정합니다.</a:t>
+            </a:r>
+            <a:endParaRPr lang="ko-KR" altLang="en-US" sz="1800">
+              <a:latin typeface="맑은 고딕" charset="0"/>
+              <a:ea typeface="맑은 고딕" charset="0"/>
+            </a:endParaRPr>
+          </a:p>
+        </p:txBody>
+      </p:sp>
+      <p:cxnSp>
+        <p:nvCxnSpPr>
+          <p:cNvPr id="1081" name="도형 49"/>
+          <p:cNvCxnSpPr/>
+          <p:nvPr/>
+        </p:nvCxnSpPr>
+        <p:spPr>
+          <a:xfrm rot="0" flipH="1" flipV="1">
+            <a:off x="8067675" y="2095500"/>
+            <a:ext cx="1181735" cy="1772285"/>
+          </a:xfrm>
+          <a:prstGeom prst="straightConnector1"/>
+          <a:ln w="6350" cap="flat" cmpd="sng">
+            <a:prstDash/>
+            <a:headEnd type="none" w="med" len="med"/>
+            <a:tailEnd type="triangle" w="med" len="med"/>
+          </a:ln>
+        </p:spPr>
+        <p:style>
+          <a:lnRef idx="1">
+            <a:schemeClr val="accent1"/>
+          </a:lnRef>
+          <a:fillRef idx="0">
+            <a:schemeClr val="accent1"/>
+          </a:fillRef>
+          <a:effectRef idx="0">
+            <a:schemeClr val="accent1"/>
+          </a:effectRef>
+          <a:fontRef idx="minor">
+            <a:schemeClr val="tx1"/>
+          </a:fontRef>
+        </p:style>
+      </p:cxnSp>
+    </p:spTree>
+  </p:cSld>
+  <p:clrMapOvr>
+    <a:masterClrMapping/>
+  </p:clrMapOvr>
+  <mc:AlternateContent xmlns:mc="http://schemas.openxmlformats.org/markup-compatibility/2006">
+    <mc:Choice xmlns:p14="http://schemas.microsoft.com/office/powerpoint/2010/main" Requires="p14">
+      <p:transition spd="slow" p14:dur="2000"/>
+    </mc:Choice>
+    <mc:Fallback>
+      <p:transition spd="slow"/>
+    </mc:Fallback>
+  </mc:AlternateContent>
+  <p:timing>
+    <p:tnLst>
+      <p:par>
+        <p:cTn id="1" dur="indefinite" restart="never" nodeType="tmRoot"/>
+      </p:par>
+    </p:tnLst>
+  </p:timing>
+</p:sld>
+</file>
+
+<file path=ppt/slides/slide2.xml><?xml version="1.0" encoding="utf-8"?>
+<p:sld xmlns:a="http://schemas.openxmlformats.org/drawingml/2006/main" xmlns:r="http://schemas.openxmlformats.org/officeDocument/2006/relationships" xmlns:p="http://schemas.openxmlformats.org/presentationml/2006/main" xmlns:p14="http://schemas.microsoft.com/office/powerpoint/2010/main">
+  <p:cSld>
+    <p:spTree>
+      <p:nvGrpSpPr>
+        <p:cNvPr id="1" name=""/>
+        <p:cNvGrpSpPr/>
+        <p:nvPr/>
+      </p:nvGrpSpPr>
+      <p:grpSpPr>
+        <a:xfrm>
+          <a:off x="0" y="0"/>
+          <a:ext cx="0" cy="0"/>
+          <a:chOff x="0" y="0"/>
+          <a:chExt cx="0" cy="0"/>
+        </a:xfrm>
+      </p:grpSpPr>
+      <p:sp>
+        <p:nvSpPr>
+          <p:cNvPr id="1031" name="Rect 0"/>
+          <p:cNvSpPr txBox="1">
+            <a:spLocks/>
+          </p:cNvSpPr>
+          <p:nvPr/>
+        </p:nvSpPr>
+        <p:spPr>
+          <a:xfrm rot="0">
+            <a:off x="4521200" y="476250"/>
+            <a:ext cx="3150870" cy="554990"/>
+          </a:xfrm>
+          <a:prstGeom prst="rect"/>
+          <a:noFill/>
+          <a:ln w="0">
+            <a:noFill/>
+            <a:prstDash/>
+          </a:ln>
+        </p:spPr>
+        <p:txBody>
+          <a:bodyPr wrap="square" lIns="89535" tIns="46355" rIns="89535" bIns="46355" numCol="1" vert="horz" anchor="t">
+            <a:spAutoFit/>
+          </a:bodyPr>
+          <a:lstStyle/>
+          <a:p>
+            <a:pPr marL="0" indent="0" algn="l" latinLnBrk="0">
+              <a:buFontTx/>
+              <a:buNone/>
+            </a:pPr>
+            <a:r>
+              <a:rPr lang="ko-KR" sz="3000" b="1">
+                <a:solidFill>
+                  <a:schemeClr val="tx1"/>
+                </a:solidFill>
+                <a:latin typeface="맑은 고딕" charset="0"/>
+                <a:ea typeface="맑은 고딕" charset="0"/>
+              </a:rPr>
+              <a:t>두 번째 튜토리얼</a:t>
+            </a:r>
+            <a:endParaRPr lang="ko-KR" altLang="en-US" sz="3000" b="1">
+              <a:solidFill>
+                <a:schemeClr val="tx1"/>
+              </a:solidFill>
+              <a:latin typeface="맑은 고딕" charset="0"/>
+              <a:ea typeface="맑은 고딕" charset="0"/>
+            </a:endParaRPr>
+          </a:p>
+        </p:txBody>
+      </p:sp>
+      <p:sp>
+        <p:nvSpPr>
+          <p:cNvPr id="1032" name="Rect 0"/>
+          <p:cNvSpPr txBox="1">
+            <a:spLocks/>
+          </p:cNvSpPr>
+          <p:nvPr/>
+        </p:nvSpPr>
+        <p:spPr>
+          <a:xfrm rot="0">
+            <a:off x="1366520" y="4399280"/>
+            <a:ext cx="4013835" cy="1784985"/>
+          </a:xfrm>
+          <a:prstGeom prst="rect"/>
+          <a:noFill/>
+          <a:ln w="0">
+            <a:noFill/>
+            <a:prstDash/>
+          </a:ln>
+        </p:spPr>
+        <p:txBody>
+          <a:bodyPr wrap="square" lIns="89535" tIns="46355" rIns="89535" bIns="46355" vert="horz" anchor="t">
+            <a:spAutoFit/>
+          </a:bodyPr>
+          <a:lstStyle/>
+          <a:p>
+            <a:pPr marL="0" indent="0" rtl="0" algn="l" defTabSz="914400" eaLnBrk="1" latinLnBrk="0" hangingPunct="1">
+              <a:buFontTx/>
+              <a:buNone/>
+            </a:pPr>
+            <a:r>
+              <a:rPr sz="2000" b="1">
+                <a:solidFill>
+                  <a:srgbClr val="0611F2"/>
+                </a:solidFill>
+                <a:latin typeface="맑은 고딕" charset="0"/>
+                <a:ea typeface="맑은 고딕" charset="0"/>
+              </a:rPr>
+              <a:t>3</a:t>
+            </a:r>
+            <a:r>
+              <a:rPr sz="2000" b="1">
+                <a:solidFill>
+                  <a:srgbClr val="0611F2"/>
+                </a:solidFill>
+                <a:latin typeface="맑은 고딕" charset="0"/>
+                <a:ea typeface="맑은 고딕" charset="0"/>
+              </a:rPr>
+              <a:t>. </a:t>
+            </a:r>
+            <a:r>
+              <a:rPr lang="ko-KR" sz="1800">
+                <a:latin typeface="맑은 고딕" charset="0"/>
+                <a:ea typeface="맑은 고딕" charset="0"/>
+              </a:rPr>
+              <a:t>그리고 Capsule 오브젝트를 선택한 다음 UI에서 Image를 생성합니다.</a:t>
+            </a:r>
+            <a:endParaRPr lang="ko-KR" altLang="en-US" sz="1800">
+              <a:latin typeface="맑은 고딕" charset="0"/>
+              <a:ea typeface="맑은 고딕" charset="0"/>
+            </a:endParaRPr>
+          </a:p>
+          <a:p>
+            <a:pPr marL="0" indent="0" rtl="0" algn="l" defTabSz="914400" eaLnBrk="1" latinLnBrk="0" hangingPunct="1">
+              <a:buFontTx/>
+              <a:buNone/>
+            </a:pPr>
+            <a:endParaRPr lang="ko-KR" altLang="en-US" sz="1800">
+              <a:latin typeface="맑은 고딕" charset="0"/>
+              <a:ea typeface="맑은 고딕" charset="0"/>
+            </a:endParaRPr>
+          </a:p>
+          <a:p>
+            <a:pPr marL="0" indent="0" rtl="0" algn="l" defTabSz="914400" eaLnBrk="1" latinLnBrk="0" hangingPunct="1">
+              <a:buFontTx/>
+              <a:buNone/>
+            </a:pPr>
+            <a:r>
+              <a:rPr lang="ko-KR" sz="1800">
+                <a:latin typeface="맑은 고딕" charset="0"/>
+                <a:ea typeface="맑은 고딕" charset="0"/>
+              </a:rPr>
+              <a:t>그다음 State라는 이름으로 정의합니다.</a:t>
+            </a:r>
+            <a:endParaRPr lang="ko-KR" altLang="en-US" sz="1800">
+              <a:latin typeface="맑은 고딕" charset="0"/>
+              <a:ea typeface="맑은 고딕" charset="0"/>
+            </a:endParaRPr>
+          </a:p>
+        </p:txBody>
+      </p:sp>
+      <p:sp>
+        <p:nvSpPr>
+          <p:cNvPr id="1037" name="Rect 0"/>
+          <p:cNvSpPr txBox="1">
+            <a:spLocks/>
+          </p:cNvSpPr>
+          <p:nvPr/>
+        </p:nvSpPr>
+        <p:spPr>
+          <a:xfrm rot="0">
+            <a:off x="6821805" y="4671695"/>
+            <a:ext cx="4094480" cy="1508125"/>
+          </a:xfrm>
+          <a:prstGeom prst="rect"/>
+          <a:noFill/>
+          <a:ln w="0">
+            <a:noFill/>
+            <a:prstDash/>
+          </a:ln>
+        </p:spPr>
+        <p:txBody>
+          <a:bodyPr wrap="square" lIns="89535" tIns="46355" rIns="89535" bIns="46355" vert="horz" anchor="t">
+            <a:spAutoFit/>
+          </a:bodyPr>
+          <a:lstStyle/>
+          <a:p>
+            <a:pPr marL="0" indent="0" rtl="0" algn="l" defTabSz="914400" eaLnBrk="1" latinLnBrk="0" hangingPunct="1">
+              <a:buFontTx/>
+              <a:buNone/>
+            </a:pPr>
+            <a:r>
+              <a:rPr lang="ko-KR" sz="2000" b="1">
+                <a:solidFill>
+                  <a:srgbClr val="0611F2"/>
+                </a:solidFill>
+                <a:latin typeface="맑은 고딕" charset="0"/>
+                <a:ea typeface="맑은 고딕" charset="0"/>
+              </a:rPr>
+              <a:t>4</a:t>
+            </a:r>
+            <a:r>
+              <a:rPr sz="2000" b="1">
+                <a:solidFill>
+                  <a:srgbClr val="0611F2"/>
+                </a:solidFill>
+                <a:latin typeface="맑은 고딕" charset="0"/>
+                <a:ea typeface="맑은 고딕" charset="0"/>
+              </a:rPr>
+              <a:t>. </a:t>
+            </a:r>
+            <a:r>
+              <a:rPr lang="ko-KR" sz="1800">
+                <a:latin typeface="맑은 고딕" charset="0"/>
+                <a:ea typeface="맑은 고딕" charset="0"/>
+              </a:rPr>
+              <a:t>이제 Canvas의 크기와 위치를 설정합니다.</a:t>
+            </a:r>
+            <a:endParaRPr lang="ko-KR" altLang="en-US" sz="1800">
+              <a:latin typeface="맑은 고딕" charset="0"/>
+              <a:ea typeface="맑은 고딕" charset="0"/>
+            </a:endParaRPr>
+          </a:p>
+          <a:p>
+            <a:pPr marL="0" indent="0" rtl="0" algn="l" defTabSz="914400" eaLnBrk="1" latinLnBrk="0" hangingPunct="1">
+              <a:buFontTx/>
+              <a:buNone/>
+            </a:pPr>
+            <a:endParaRPr lang="ko-KR" altLang="en-US" sz="1800">
+              <a:latin typeface="맑은 고딕" charset="0"/>
+              <a:ea typeface="맑은 고딕" charset="0"/>
+            </a:endParaRPr>
+          </a:p>
+          <a:p>
+            <a:pPr marL="0" indent="0" rtl="0" algn="l" defTabSz="914400" eaLnBrk="1" latinLnBrk="0" hangingPunct="1">
+              <a:buFontTx/>
+              <a:buNone/>
+            </a:pPr>
+            <a:r>
+              <a:rPr lang="ko-KR" sz="1800">
+                <a:latin typeface="맑은 고딕" charset="0"/>
+                <a:ea typeface="맑은 고딕" charset="0"/>
+              </a:rPr>
+              <a:t>그런 다음 Render Mode를 World Space로 변경합니다.</a:t>
+            </a:r>
+            <a:endParaRPr lang="ko-KR" altLang="en-US" sz="1800">
+              <a:latin typeface="맑은 고딕" charset="0"/>
+              <a:ea typeface="맑은 고딕" charset="0"/>
+            </a:endParaRPr>
+          </a:p>
+        </p:txBody>
+      </p:sp>
+      <p:pic>
+        <p:nvPicPr>
+          <p:cNvPr id="1040" name="그림 26"/>
           <p:cNvPicPr>
             <a:picLocks noChangeAspect="1"/>
           </p:cNvPicPr>
@@ -10278,7 +11665,7 @@
       </p:pic>
       <p:pic>
         <p:nvPicPr>
-          <p:cNvPr id="1041" name="그림 27" descr="C:/Users/Admin1/AppData/Roaming/PolarisOffice/ETemp/17076_14861856/fImage53103061478.png"/>
+          <p:cNvPr id="1041" name="그림 27"/>
           <p:cNvPicPr>
             <a:picLocks noChangeAspect="1"/>
           </p:cNvPicPr>
@@ -10309,7 +11696,7 @@
       </p:pic>
       <p:pic>
         <p:nvPicPr>
-          <p:cNvPr id="1042" name="그림 30" descr="C:/Users/Admin1/AppData/Roaming/PolarisOffice/ETemp/17076_14861856/fImage340933079358.png"/>
+          <p:cNvPr id="1042" name="그림 30"/>
           <p:cNvPicPr>
             <a:picLocks noChangeAspect="1"/>
           </p:cNvPicPr>
@@ -10360,7 +11747,7 @@
 </file>
 
 <file path=ppt/slides/slide3.xml><?xml version="1.0" encoding="utf-8"?>
-<p:sld xmlns:a="http://schemas.openxmlformats.org/drawingml/2006/main" xmlns:r="http://schemas.openxmlformats.org/officeDocument/2006/relationships" xmlns:p="http://schemas.openxmlformats.org/presentationml/2006/main">
+<p:sld xmlns:a="http://schemas.openxmlformats.org/drawingml/2006/main" xmlns:r="http://schemas.openxmlformats.org/officeDocument/2006/relationships" xmlns:p="http://schemas.openxmlformats.org/presentationml/2006/main" xmlns:p14="http://schemas.microsoft.com/office/powerpoint/2010/main">
   <p:cSld>
     <p:spTree>
       <p:nvGrpSpPr>
@@ -10556,7 +11943,7 @@
       </p:sp>
       <p:pic>
         <p:nvPicPr>
-          <p:cNvPr id="1043" name="그림 35" descr="C:/Users/Admin1/AppData/Roaming/PolarisOffice/ETemp/17076_14861856/fImage181873176962.png"/>
+          <p:cNvPr id="1043" name="그림 35"/>
           <p:cNvPicPr>
             <a:picLocks noChangeAspect="1"/>
           </p:cNvPicPr>
@@ -10587,7 +11974,7 @@
       </p:pic>
       <p:pic>
         <p:nvPicPr>
-          <p:cNvPr id="1044" name="그림 38" descr="C:/Users/Admin1/AppData/Roaming/PolarisOffice/ETemp/17076_14861856/fImage67923184464.png"/>
+          <p:cNvPr id="1044" name="그림 38"/>
           <p:cNvPicPr>
             <a:picLocks noChangeAspect="1"/>
           </p:cNvPicPr>
@@ -10618,7 +12005,7 @@
       </p:pic>
       <p:pic>
         <p:nvPicPr>
-          <p:cNvPr id="1045" name="그림 39" descr="C:/Users/Admin1/AppData/Roaming/PolarisOffice/ETemp/17076_14861856/fImage54943195705.png"/>
+          <p:cNvPr id="1045" name="그림 39"/>
           <p:cNvPicPr>
             <a:picLocks noChangeAspect="1"/>
           </p:cNvPicPr>
@@ -10746,7 +12133,7 @@
       </p:sp>
       <p:pic>
         <p:nvPicPr>
-          <p:cNvPr id="1048" name="그림 45" descr="C:/Users/Admin1/AppData/Roaming/PolarisOffice/ETemp/17076_14861856/fImage191383248145.png"/>
+          <p:cNvPr id="1048" name="그림 45"/>
           <p:cNvPicPr>
             <a:picLocks noChangeAspect="1"/>
           </p:cNvPicPr>
@@ -10777,7 +12164,7 @@
       </p:pic>
       <p:pic>
         <p:nvPicPr>
-          <p:cNvPr id="1049" name="그림 46" descr="C:/Users/Admin1/AppData/Roaming/PolarisOffice/ETemp/17076_14861856/fImage73883253281.png"/>
+          <p:cNvPr id="1049" name="그림 46"/>
           <p:cNvPicPr>
             <a:picLocks noChangeAspect="1"/>
           </p:cNvPicPr>
@@ -10830,7 +12217,7 @@
 </file>
 
 <file path=ppt/slides/slide4.xml><?xml version="1.0" encoding="utf-8"?>
-<p:sld xmlns:a="http://schemas.openxmlformats.org/drawingml/2006/main" xmlns:r="http://schemas.openxmlformats.org/officeDocument/2006/relationships" xmlns:p="http://schemas.openxmlformats.org/presentationml/2006/main">
+<p:sld xmlns:a="http://schemas.openxmlformats.org/drawingml/2006/main" xmlns:r="http://schemas.openxmlformats.org/officeDocument/2006/relationships" xmlns:p="http://schemas.openxmlformats.org/presentationml/2006/main" xmlns:p14="http://schemas.microsoft.com/office/powerpoint/2010/main">
   <p:cSld>
     <p:spTree>
       <p:nvGrpSpPr>
@@ -11026,7 +12413,7 @@
       </p:sp>
       <p:pic>
         <p:nvPicPr>
-          <p:cNvPr id="1050" name="그림 49" descr="C:/Users/Admin1/AppData/Roaming/PolarisOffice/ETemp/17076_14861856/fImage123893396827.png"/>
+          <p:cNvPr id="1050" name="그림 49"/>
           <p:cNvPicPr>
             <a:picLocks noChangeAspect="1"/>
           </p:cNvPicPr>
@@ -11057,7 +12444,7 @@
       </p:pic>
       <p:pic>
         <p:nvPicPr>
-          <p:cNvPr id="1051" name="그림 52" descr="C:/Users/Admin1/AppData/Roaming/PolarisOffice/ETemp/17076_14861856/fImage22403409961.png"/>
+          <p:cNvPr id="1051" name="그림 52"/>
           <p:cNvPicPr>
             <a:picLocks noChangeAspect="1"/>
           </p:cNvPicPr>
@@ -11088,7 +12475,7 @@
       </p:pic>
       <p:pic>
         <p:nvPicPr>
-          <p:cNvPr id="1052" name="그림 55" descr="C:/Users/Admin1/AppData/Roaming/PolarisOffice/ETemp/17076_14861856/fImage7388341491.png"/>
+          <p:cNvPr id="1052" name="그림 55"/>
           <p:cNvPicPr>
             <a:picLocks noChangeAspect="1"/>
           </p:cNvPicPr>
@@ -11218,7 +12605,7 @@
       </p:cxnSp>
       <p:pic>
         <p:nvPicPr>
-          <p:cNvPr id="1055" name="그림 58" descr="C:/Users/Admin1/AppData/Roaming/PolarisOffice/ETemp/17076_14861856/fImage81203442995.png"/>
+          <p:cNvPr id="1055" name="그림 58"/>
           <p:cNvPicPr>
             <a:picLocks noChangeAspect="1"/>
           </p:cNvPicPr>
@@ -11349,7 +12736,7 @@
       </p:sp>
       <p:pic>
         <p:nvPicPr>
-          <p:cNvPr id="1046" name="그림 61" descr="C:/Users/Admin1/AppData/Roaming/PolarisOffice/ETemp/17076_14861856/fImage75183451942.png"/>
+          <p:cNvPr id="1046" name="그림 61"/>
           <p:cNvPicPr>
             <a:picLocks noChangeAspect="1"/>
           </p:cNvPicPr>
@@ -11496,7 +12883,7 @@
       </p:sp>
       <p:pic>
         <p:nvPicPr>
-          <p:cNvPr id="1048" name="그림 103" descr="C:/Users/Admin1/AppData/Roaming/PolarisOffice/ETemp/17076_14861856/fImage163173934827.png"/>
+          <p:cNvPr id="1048" name="그림 103"/>
           <p:cNvPicPr>
             <a:picLocks noChangeAspect="1"/>
           </p:cNvPicPr>
@@ -11527,7 +12914,7 @@
       </p:pic>
       <p:pic>
         <p:nvPicPr>
-          <p:cNvPr id="1049" name="그림 106" descr="C:/Users/Admin1/AppData/Roaming/PolarisOffice/ETemp/17076_14861856/fImage333103945436.png"/>
+          <p:cNvPr id="1049" name="그림 106"/>
           <p:cNvPicPr>
             <a:picLocks noChangeAspect="1"/>
           </p:cNvPicPr>
@@ -11677,7 +13064,7 @@
 </file>
 
 <file path=ppt/slides/slide6.xml><?xml version="1.0" encoding="utf-8"?>
-<p:sld xmlns:a="http://schemas.openxmlformats.org/drawingml/2006/main" xmlns:r="http://schemas.openxmlformats.org/officeDocument/2006/relationships" xmlns:p="http://schemas.openxmlformats.org/presentationml/2006/main">
+<p:sld xmlns:a="http://schemas.openxmlformats.org/drawingml/2006/main" xmlns:r="http://schemas.openxmlformats.org/officeDocument/2006/relationships" xmlns:p="http://schemas.openxmlformats.org/presentationml/2006/main" xmlns:p14="http://schemas.microsoft.com/office/powerpoint/2010/main">
   <p:cSld>
     <p:spTree>
       <p:nvGrpSpPr>
@@ -11937,7 +13324,7 @@
       </p:sp>
       <p:pic>
         <p:nvPicPr>
-          <p:cNvPr id="1048" name="그림 68" descr="C:/Users/Admin1/AppData/Roaming/PolarisOffice/ETemp/17076_14861856/fImage45123572391.png"/>
+          <p:cNvPr id="1048" name="그림 68"/>
           <p:cNvPicPr>
             <a:picLocks noChangeAspect="1"/>
           </p:cNvPicPr>
@@ -11968,7 +13355,7 @@
       </p:pic>
       <p:pic>
         <p:nvPicPr>
-          <p:cNvPr id="1049" name="그림 72" descr="C:/Users/Admin1/AppData/Roaming/PolarisOffice/ETemp/17076_14861856/fImage56073604604.png"/>
+          <p:cNvPr id="1049" name="그림 72"/>
           <p:cNvPicPr>
             <a:picLocks noChangeAspect="1"/>
           </p:cNvPicPr>
@@ -12021,7 +13408,7 @@
 </file>
 
 <file path=ppt/slides/slide7.xml><?xml version="1.0" encoding="utf-8"?>
-<p:sld xmlns:a="http://schemas.openxmlformats.org/drawingml/2006/main" xmlns:r="http://schemas.openxmlformats.org/officeDocument/2006/relationships" xmlns:p="http://schemas.openxmlformats.org/presentationml/2006/main">
+<p:sld xmlns:a="http://schemas.openxmlformats.org/drawingml/2006/main" xmlns:r="http://schemas.openxmlformats.org/officeDocument/2006/relationships" xmlns:p="http://schemas.openxmlformats.org/presentationml/2006/main" xmlns:p14="http://schemas.microsoft.com/office/powerpoint/2010/main">
   <p:cSld>
     <p:spTree>
       <p:nvGrpSpPr>
@@ -12278,7 +13665,7 @@
       </p:sp>
       <p:pic>
         <p:nvPicPr>
-          <p:cNvPr id="1054" name="그림 86" descr="C:/Users/Admin1/AppData/Roaming/PolarisOffice/ETemp/17076_14861856/fImage87813833902.png"/>
+          <p:cNvPr id="1054" name="그림 86"/>
           <p:cNvPicPr>
             <a:picLocks noChangeAspect="1"/>
           </p:cNvPicPr>
@@ -12307,7 +13694,7 @@
       </p:pic>
       <p:pic>
         <p:nvPicPr>
-          <p:cNvPr id="1055" name="그림 88" descr="C:/Users/Admin1/AppData/Roaming/PolarisOffice/ETemp/17076_14861856/fImage258719385153.png"/>
+          <p:cNvPr id="1055" name="그림 88"/>
           <p:cNvPicPr>
             <a:picLocks noChangeAspect="1"/>
           </p:cNvPicPr>
@@ -12336,7 +13723,7 @@
       </p:pic>
       <p:pic>
         <p:nvPicPr>
-          <p:cNvPr id="1056" name="그림 89" descr="C:/Users/Admin1/AppData/Roaming/PolarisOffice/ETemp/17076_14861856/fImage409818386292.png"/>
+          <p:cNvPr id="1056" name="그림 89"/>
           <p:cNvPicPr>
             <a:picLocks noChangeAspect="1"/>
           </p:cNvPicPr>
@@ -12387,6 +13774,481 @@
 </file>
 
 <file path=ppt/slides/slide8.xml><?xml version="1.0" encoding="utf-8"?>
+<p:sld xmlns:a="http://schemas.openxmlformats.org/drawingml/2006/main" xmlns:r="http://schemas.openxmlformats.org/officeDocument/2006/relationships" xmlns:p="http://schemas.openxmlformats.org/presentationml/2006/main" xmlns:p14="http://schemas.microsoft.com/office/powerpoint/2010/main">
+  <p:cSld>
+    <p:spTree>
+      <p:nvGrpSpPr>
+        <p:cNvPr id="1" name=""/>
+        <p:cNvGrpSpPr/>
+        <p:nvPr/>
+      </p:nvGrpSpPr>
+      <p:grpSpPr>
+        <a:xfrm>
+          <a:off x="0" y="0"/>
+          <a:ext cx="0" cy="0"/>
+          <a:chOff x="0" y="0"/>
+          <a:chExt cx="0" cy="0"/>
+        </a:xfrm>
+      </p:grpSpPr>
+      <p:sp>
+        <p:nvSpPr>
+          <p:cNvPr id="1031" name="Rect 0"/>
+          <p:cNvSpPr txBox="1">
+            <a:spLocks/>
+          </p:cNvSpPr>
+          <p:nvPr/>
+        </p:nvSpPr>
+        <p:spPr>
+          <a:xfrm rot="0">
+            <a:off x="4333240" y="476250"/>
+            <a:ext cx="3541395" cy="554990"/>
+          </a:xfrm>
+          <a:prstGeom prst="rect"/>
+          <a:noFill/>
+          <a:ln w="0">
+            <a:noFill/>
+            <a:prstDash/>
+          </a:ln>
+        </p:spPr>
+        <p:txBody>
+          <a:bodyPr wrap="square" lIns="89535" tIns="46355" rIns="89535" bIns="46355" numCol="1" vert="horz" anchor="t">
+            <a:spAutoFit/>
+          </a:bodyPr>
+          <a:lstStyle/>
+          <a:p>
+            <a:pPr marL="0" indent="0" algn="l" latinLnBrk="0">
+              <a:buFontTx/>
+              <a:buNone/>
+            </a:pPr>
+            <a:r>
+              <a:rPr lang="ko-KR" sz="3000" b="1">
+                <a:solidFill>
+                  <a:schemeClr val="tx1"/>
+                </a:solidFill>
+                <a:latin typeface="맑은 고딕" charset="0"/>
+                <a:ea typeface="맑은 고딕" charset="0"/>
+              </a:rPr>
+              <a:t>여덟 번째 튜토리얼</a:t>
+            </a:r>
+            <a:endParaRPr lang="ko-KR" altLang="en-US" sz="3000" b="1">
+              <a:solidFill>
+                <a:schemeClr val="tx1"/>
+              </a:solidFill>
+              <a:latin typeface="맑은 고딕" charset="0"/>
+              <a:ea typeface="맑은 고딕" charset="0"/>
+            </a:endParaRPr>
+          </a:p>
+        </p:txBody>
+      </p:sp>
+      <p:sp>
+        <p:nvSpPr>
+          <p:cNvPr id="1053" name="텍스트 상자 81"/>
+          <p:cNvSpPr txBox="1">
+            <a:spLocks/>
+          </p:cNvSpPr>
+          <p:nvPr/>
+        </p:nvSpPr>
+        <p:spPr>
+          <a:xfrm rot="0">
+            <a:off x="1404620" y="4150995"/>
+            <a:ext cx="3928110" cy="2031365"/>
+          </a:xfrm>
+          <a:prstGeom prst="rect"/>
+          <a:noFill/>
+          <a:ln w="0">
+            <a:noFill/>
+            <a:prstDash/>
+          </a:ln>
+        </p:spPr>
+        <p:txBody>
+          <a:bodyPr wrap="square" lIns="89535" tIns="46355" rIns="89535" bIns="46355" numCol="1" vert="horz" anchor="t">
+            <a:spAutoFit/>
+          </a:bodyPr>
+          <a:lstStyle/>
+          <a:p>
+            <a:pPr marL="0" indent="0" rtl="0" algn="l" defTabSz="914400" eaLnBrk="1" latinLnBrk="0" hangingPunct="1">
+              <a:buFontTx/>
+              <a:buNone/>
+            </a:pPr>
+            <a:r>
+              <a:rPr sz="1800">
+                <a:latin typeface="맑은 고딕" charset="0"/>
+                <a:ea typeface="맑은 고딕" charset="0"/>
+              </a:rPr>
+              <a:t>GetComponent&lt;Type&gt;(</a:t>
+            </a:r>
+            <a:r>
+              <a:rPr sz="1800">
+                <a:latin typeface="맑은 고딕" charset="0"/>
+                <a:ea typeface="맑은 고딕" charset="0"/>
+              </a:rPr>
+              <a:t> </a:t>
+            </a:r>
+            <a:r>
+              <a:rPr sz="1800">
+                <a:latin typeface="맑은 고딕" charset="0"/>
+                <a:ea typeface="맑은 고딕" charset="0"/>
+              </a:rPr>
+              <a:t>)는 게임 오브젝트의 컴포넌트를 가져오는 함수입니다.</a:t>
+            </a:r>
+            <a:endParaRPr lang="ko-KR" altLang="en-US" sz="1800">
+              <a:latin typeface="맑은 고딕" charset="0"/>
+              <a:ea typeface="맑은 고딕" charset="0"/>
+            </a:endParaRPr>
+          </a:p>
+          <a:p>
+            <a:pPr marL="0" indent="0" rtl="0" algn="l" defTabSz="914400" eaLnBrk="1" latinLnBrk="0" hangingPunct="1">
+              <a:buFontTx/>
+              <a:buNone/>
+            </a:pPr>
+            <a:endParaRPr lang="ko-KR" altLang="en-US" sz="1800">
+              <a:latin typeface="맑은 고딕" charset="0"/>
+              <a:ea typeface="맑은 고딕" charset="0"/>
+            </a:endParaRPr>
+          </a:p>
+          <a:p>
+            <a:pPr marL="0" indent="0" algn="l" latinLnBrk="0" hangingPunct="1">
+              <a:buFontTx/>
+              <a:buNone/>
+            </a:pPr>
+            <a:r>
+              <a:rPr lang="ko-KR" sz="1800">
+                <a:latin typeface="맑은 고딕" charset="0"/>
+                <a:ea typeface="맑은 고딕" charset="0"/>
+              </a:rPr>
+              <a:t>원하는 컴포넌트</a:t>
+            </a:r>
+            <a:r>
+              <a:rPr lang="ko-KR" sz="1800">
+                <a:latin typeface="맑은 고딕" charset="0"/>
+                <a:ea typeface="맑은 고딕" charset="0"/>
+              </a:rPr>
+              <a:t>에 있는 속성을 사용하려면</a:t>
+            </a:r>
+            <a:r>
+              <a:rPr lang="ko-KR" sz="1800">
+                <a:latin typeface="맑은 고딕" charset="0"/>
+                <a:ea typeface="맑은 고딕" charset="0"/>
+              </a:rPr>
+              <a:t> </a:t>
+            </a:r>
+            <a:r>
+              <a:rPr lang="ko-KR" sz="1800">
+                <a:latin typeface="맑은 고딕" charset="0"/>
+                <a:ea typeface="맑은 고딕" charset="0"/>
+              </a:rPr>
+              <a:t>게임 오브젝트에 컴포넌트가 들어가 있어야 합니다.</a:t>
+            </a:r>
+            <a:endParaRPr lang="ko-KR" altLang="en-US" sz="1800">
+              <a:latin typeface="맑은 고딕" charset="0"/>
+              <a:ea typeface="맑은 고딕" charset="0"/>
+            </a:endParaRPr>
+          </a:p>
+        </p:txBody>
+      </p:sp>
+      <p:pic>
+        <p:nvPicPr>
+          <p:cNvPr id="1055" name="그림 93" descr="C:/Users/Admin1/AppData/Roaming/PolarisOffice/ETemp/18200_22907784/fImage41813882382.png"/>
+          <p:cNvPicPr>
+            <a:picLocks noChangeAspect="1"/>
+          </p:cNvPicPr>
+          <p:nvPr/>
+        </p:nvPicPr>
+        <p:blipFill rotWithShape="1">
+          <a:blip r:embed="rId2" cstate="hqprint">
+            <a:extLst>
+              <a:ext uri="{28A0092B-C50C-407E-A947-70E740481C1C}">
+                <a14:useLocalDpi xmlns:a14="http://schemas.microsoft.com/office/drawing/2010/main"/>
+              </a:ext>
+            </a:extLst>
+          </a:blip>
+          <a:stretch>
+            <a:fillRect/>
+          </a:stretch>
+        </p:blipFill>
+        <p:spPr>
+          <a:xfrm rot="0">
+            <a:off x="6826250" y="1479550"/>
+            <a:ext cx="4106545" cy="2525395"/>
+          </a:xfrm>
+          <a:prstGeom prst="roundRect"/>
+          <a:solidFill>
+            <a:srgbClr val="EDEDED"/>
+          </a:solidFill>
+        </p:spPr>
+      </p:pic>
+      <p:pic>
+        <p:nvPicPr>
+          <p:cNvPr id="1056" name="그림 97"/>
+          <p:cNvPicPr>
+            <a:picLocks noChangeAspect="1"/>
+          </p:cNvPicPr>
+          <p:nvPr/>
+        </p:nvPicPr>
+        <p:blipFill rotWithShape="1">
+          <a:blip r:embed="rId3" cstate="print">
+            <a:extLst>
+              <a:ext uri="{28A0092B-C50C-407E-A947-70E740481C1C}">
+                <a14:useLocalDpi xmlns:a14="http://schemas.microsoft.com/office/drawing/2010/main" val="0"/>
+              </a:ext>
+            </a:extLst>
+          </a:blip>
+          <a:stretch>
+            <a:fillRect/>
+          </a:stretch>
+        </p:blipFill>
+        <p:spPr>
+          <a:xfrm rot="0">
+            <a:off x="1409700" y="1470660"/>
+            <a:ext cx="1977390" cy="2413635"/>
+          </a:xfrm>
+          <a:prstGeom prst="roundRect"/>
+          <a:solidFill>
+            <a:srgbClr val="EDEDED"/>
+          </a:solidFill>
+        </p:spPr>
+      </p:pic>
+      <p:pic>
+        <p:nvPicPr>
+          <p:cNvPr id="1057" name="그림 100" descr="C:/Users/Admin1/AppData/Roaming/PolarisOffice/ETemp/18200_22907784/fImage4088163908716.png"/>
+          <p:cNvPicPr>
+            <a:picLocks noChangeAspect="1"/>
+          </p:cNvPicPr>
+          <p:nvPr/>
+        </p:nvPicPr>
+        <p:blipFill rotWithShape="1">
+          <a:blip r:embed="rId4" cstate="hqprint">
+            <a:extLst>
+              <a:ext uri="{28A0092B-C50C-407E-A947-70E740481C1C}">
+                <a14:useLocalDpi xmlns:a14="http://schemas.microsoft.com/office/drawing/2010/main"/>
+              </a:ext>
+            </a:extLst>
+          </a:blip>
+          <a:stretch>
+            <a:fillRect/>
+          </a:stretch>
+        </p:blipFill>
+        <p:spPr>
+          <a:xfrm rot="0">
+            <a:off x="4040505" y="2033905"/>
+            <a:ext cx="1287780" cy="752475"/>
+          </a:xfrm>
+          <a:prstGeom prst="rect"/>
+          <a:noFill/>
+        </p:spPr>
+      </p:pic>
+      <p:pic>
+        <p:nvPicPr>
+          <p:cNvPr id="1058" name="그림 101"/>
+          <p:cNvPicPr>
+            <a:picLocks noChangeAspect="1"/>
+          </p:cNvPicPr>
+          <p:nvPr/>
+        </p:nvPicPr>
+        <p:blipFill rotWithShape="1">
+          <a:blip r:embed="rId5" cstate="print">
+            <a:extLst>
+              <a:ext uri="{28A0092B-C50C-407E-A947-70E740481C1C}">
+                <a14:useLocalDpi xmlns:a14="http://schemas.microsoft.com/office/drawing/2010/main" val="0"/>
+              </a:ext>
+            </a:extLst>
+          </a:blip>
+          <a:stretch>
+            <a:fillRect/>
+          </a:stretch>
+        </p:blipFill>
+        <p:spPr>
+          <a:xfrm rot="0">
+            <a:off x="3164205" y="2317750"/>
+            <a:ext cx="688975" cy="392430"/>
+          </a:xfrm>
+          <a:prstGeom prst="rect"/>
+          <a:noFill/>
+        </p:spPr>
+      </p:pic>
+      <p:pic>
+        <p:nvPicPr>
+          <p:cNvPr id="1059" name="그림 1" descr="C:/Users/Admin1/AppData/Roaming/PolarisOffice/ETemp/18200_22907784/fImage1437533919718.png"/>
+          <p:cNvPicPr>
+            <a:picLocks noChangeAspect="1"/>
+          </p:cNvPicPr>
+          <p:nvPr/>
+        </p:nvPicPr>
+        <p:blipFill rotWithShape="1">
+          <a:blip r:embed="rId5" cstate="hqprint">
+            <a:extLst>
+              <a:ext uri="{28A0092B-C50C-407E-A947-70E740481C1C}">
+                <a14:useLocalDpi xmlns:a14="http://schemas.microsoft.com/office/drawing/2010/main"/>
+              </a:ext>
+            </a:extLst>
+          </a:blip>
+          <a:stretch>
+            <a:fillRect/>
+          </a:stretch>
+        </p:blipFill>
+        <p:spPr>
+          <a:xfrm rot="0">
+            <a:off x="3166745" y="3124835"/>
+            <a:ext cx="689610" cy="393065"/>
+          </a:xfrm>
+          <a:prstGeom prst="rect"/>
+          <a:noFill/>
+        </p:spPr>
+      </p:pic>
+      <p:pic>
+        <p:nvPicPr>
+          <p:cNvPr id="1060" name="그림 2" descr="C:/Users/Admin1/AppData/Roaming/PolarisOffice/ETemp/18200_22907784/fImage73851412541.png"/>
+          <p:cNvPicPr>
+            <a:picLocks noChangeAspect="1"/>
+          </p:cNvPicPr>
+          <p:nvPr/>
+        </p:nvPicPr>
+        <p:blipFill rotWithShape="1">
+          <a:blip r:embed="rId7" cstate="print">
+            <a:extLst>
+              <a:ext uri="{28A0092B-C50C-407E-A947-70E740481C1C}">
+                <a14:useLocalDpi xmlns:a14="http://schemas.microsoft.com/office/drawing/2010/main" val="0"/>
+              </a:ext>
+            </a:extLst>
+          </a:blip>
+          <a:stretch>
+            <a:fillRect/>
+          </a:stretch>
+        </p:blipFill>
+        <p:spPr>
+          <a:xfrm rot="0">
+            <a:off x="4057650" y="3009900"/>
+            <a:ext cx="1278890" cy="631825"/>
+          </a:xfrm>
+          <a:prstGeom prst="rect"/>
+          <a:noFill/>
+        </p:spPr>
+      </p:pic>
+      <p:sp>
+        <p:nvSpPr>
+          <p:cNvPr id="1061" name="텍스트 상자 3"/>
+          <p:cNvSpPr txBox="1">
+            <a:spLocks/>
+          </p:cNvSpPr>
+          <p:nvPr/>
+        </p:nvSpPr>
+        <p:spPr>
+          <a:xfrm rot="0">
+            <a:off x="6826885" y="4123055"/>
+            <a:ext cx="4114800" cy="2061845"/>
+          </a:xfrm>
+          <a:prstGeom prst="rect"/>
+          <a:noFill/>
+          <a:ln w="0">
+            <a:noFill/>
+            <a:prstDash/>
+          </a:ln>
+        </p:spPr>
+        <p:txBody>
+          <a:bodyPr wrap="square" lIns="89535" tIns="46355" rIns="89535" bIns="46355" numCol="1" vert="horz" anchor="t">
+            <a:spAutoFit/>
+          </a:bodyPr>
+          <a:lstStyle/>
+          <a:p>
+            <a:pPr marL="0" indent="0" rtl="0" algn="l" defTabSz="914400" eaLnBrk="1" latinLnBrk="0" hangingPunct="1">
+              <a:buFontTx/>
+              <a:buNone/>
+            </a:pPr>
+            <a:r>
+              <a:rPr lang="ko-KR" sz="2000" b="1">
+                <a:solidFill>
+                  <a:srgbClr val="0611F2"/>
+                </a:solidFill>
+                <a:latin typeface="맑은 고딕" charset="0"/>
+                <a:ea typeface="맑은 고딕" charset="0"/>
+              </a:rPr>
+              <a:t>1</a:t>
+            </a:r>
+            <a:r>
+              <a:rPr lang="ko-KR" sz="2000" b="1">
+                <a:solidFill>
+                  <a:srgbClr val="0611F2"/>
+                </a:solidFill>
+                <a:latin typeface="맑은 고딕" charset="0"/>
+                <a:ea typeface="맑은 고딕" charset="0"/>
+              </a:rPr>
+              <a:t>6</a:t>
+            </a:r>
+            <a:r>
+              <a:rPr sz="2000" b="1">
+                <a:solidFill>
+                  <a:srgbClr val="0611F2"/>
+                </a:solidFill>
+                <a:latin typeface="맑은 고딕" charset="0"/>
+                <a:ea typeface="맑은 고딕" charset="0"/>
+              </a:rPr>
+              <a:t>. </a:t>
+            </a:r>
+            <a:r>
+              <a:rPr lang="ko-KR" sz="1800">
+                <a:latin typeface="맑은 고딕" charset="0"/>
+                <a:ea typeface="맑은 고딕" charset="0"/>
+              </a:rPr>
+              <a:t>이제 Start( ) 함수에서 Position 함수를 지정한 시간 후에 지정된 시간마다 반복적으로 호출하도록 설정합니다.</a:t>
+            </a:r>
+            <a:endParaRPr lang="ko-KR" altLang="en-US" sz="1800">
+              <a:latin typeface="맑은 고딕" charset="0"/>
+              <a:ea typeface="맑은 고딕" charset="0"/>
+            </a:endParaRPr>
+          </a:p>
+          <a:p>
+            <a:pPr marL="0" indent="0" rtl="0" algn="l" defTabSz="914400" eaLnBrk="1" latinLnBrk="0" hangingPunct="1">
+              <a:buFontTx/>
+              <a:buNone/>
+            </a:pPr>
+            <a:endParaRPr lang="ko-KR" altLang="en-US" sz="1800">
+              <a:latin typeface="맑은 고딕" charset="0"/>
+              <a:ea typeface="맑은 고딕" charset="0"/>
+            </a:endParaRPr>
+          </a:p>
+          <a:p>
+            <a:pPr marL="0" indent="0" rtl="0" algn="l" defTabSz="914400" eaLnBrk="1" latinLnBrk="0" hangingPunct="1">
+              <a:buFontTx/>
+              <a:buNone/>
+            </a:pPr>
+            <a:r>
+              <a:rPr lang="ko-KR" sz="1800">
+                <a:latin typeface="맑은 고딕" charset="0"/>
+                <a:ea typeface="맑은 고딕" charset="0"/>
+              </a:rPr>
+              <a:t>그런 다음 Paint( ) 코루틴 함수를 호출합니다.</a:t>
+            </a:r>
+            <a:endParaRPr lang="ko-KR" altLang="en-US" sz="1800">
+              <a:latin typeface="맑은 고딕" charset="0"/>
+              <a:ea typeface="맑은 고딕" charset="0"/>
+            </a:endParaRPr>
+          </a:p>
+        </p:txBody>
+      </p:sp>
+    </p:spTree>
+  </p:cSld>
+  <p:clrMapOvr>
+    <a:masterClrMapping/>
+  </p:clrMapOvr>
+  <mc:AlternateContent xmlns:mc="http://schemas.openxmlformats.org/markup-compatibility/2006">
+    <mc:Choice xmlns:p14="http://schemas.microsoft.com/office/powerpoint/2010/main" Requires="p14">
+      <p:transition spd="slow" p14:dur="2000"/>
+    </mc:Choice>
+    <mc:Fallback>
+      <p:transition spd="slow"/>
+    </mc:Fallback>
+  </mc:AlternateContent>
+  <p:timing>
+    <p:tnLst>
+      <p:par>
+        <p:cTn id="1" dur="indefinite" restart="never" nodeType="tmRoot"/>
+      </p:par>
+    </p:tnLst>
+  </p:timing>
+</p:sld>
+</file>
+
+<file path=ppt/slides/slide9.xml><?xml version="1.0" encoding="utf-8"?>
 <p:sld xmlns:a="http://schemas.openxmlformats.org/drawingml/2006/main" xmlns:r="http://schemas.openxmlformats.org/officeDocument/2006/relationships" xmlns:p="http://schemas.openxmlformats.org/presentationml/2006/main">
   <p:cSld>
     <p:spTree>
@@ -12414,7 +14276,7 @@
         <p:spPr>
           <a:xfrm rot="0">
             <a:off x="4333240" y="476250"/>
-            <a:ext cx="3541395" cy="554990"/>
+            <a:ext cx="3542030" cy="554990"/>
           </a:xfrm>
           <a:prstGeom prst="rect"/>
           <a:noFill/>
@@ -12441,7 +14303,17 @@
                 <a:latin typeface="맑은 고딕" charset="0"/>
                 <a:ea typeface="맑은 고딕" charset="0"/>
               </a:rPr>
-              <a:t>여덟 번째 튜토리얼</a:t>
+              <a:t>아홉</a:t>
+            </a:r>
+            <a:r>
+              <a:rPr lang="ko-KR" sz="3000" b="1">
+                <a:solidFill>
+                  <a:schemeClr val="tx1"/>
+                </a:solidFill>
+                <a:latin typeface="맑은 고딕" charset="0"/>
+                <a:ea typeface="맑은 고딕" charset="0"/>
+              </a:rPr>
+              <a:t> 번째 튜토리얼</a:t>
             </a:r>
             <a:endParaRPr lang="ko-KR" altLang="en-US" sz="3000" b="1">
               <a:solidFill>
@@ -12455,7 +14327,7 @@
       </p:sp>
       <p:sp>
         <p:nvSpPr>
-          <p:cNvPr id="1053" name="텍스트 상자 81"/>
+          <p:cNvPr id="1053" name="Rect 0"/>
           <p:cNvSpPr txBox="1">
             <a:spLocks/>
           </p:cNvSpPr>
@@ -12463,8 +14335,8 @@
         </p:nvSpPr>
         <p:spPr>
           <a:xfrm rot="0">
-            <a:off x="1404620" y="4150995"/>
-            <a:ext cx="3928110" cy="2031365"/>
+            <a:off x="1395095" y="3875405"/>
+            <a:ext cx="3987165" cy="2308225"/>
           </a:xfrm>
           <a:prstGeom prst="rect"/>
           <a:noFill/>
@@ -12484,25 +14356,11 @@
               <a:buNone/>
             </a:pPr>
             <a:r>
-              <a:rPr sz="1800">
-                <a:latin typeface="맑은 고딕" charset="0"/>
-                <a:ea typeface="맑은 고딕" charset="0"/>
-              </a:rPr>
-              <a:t>GetComponent&lt;Type&gt;(</a:t>
-            </a:r>
-            <a:r>
-              <a:rPr sz="1800">
-                <a:latin typeface="맑은 고딕" charset="0"/>
-                <a:ea typeface="맑은 고딕" charset="0"/>
-              </a:rPr>
-              <a:t> </a:t>
-            </a:r>
-            <a:r>
-              <a:rPr sz="1800">
-                <a:latin typeface="맑은 고딕" charset="0"/>
-                <a:ea typeface="맑은 고딕" charset="0"/>
-              </a:rPr>
-              <a:t>)는 게임 오브젝트의 컴포넌트를 가져오는 함수입니다.</a:t>
+              <a:rPr lang="ko-KR" sz="1800">
+                <a:latin typeface="맑은 고딕" charset="0"/>
+                <a:ea typeface="맑은 고딕" charset="0"/>
+              </a:rPr>
+              <a:t>코루틴 함수란?</a:t>
             </a:r>
             <a:endParaRPr lang="ko-KR" altLang="en-US" sz="1800">
               <a:latin typeface="맑은 고딕" charset="0"/>
@@ -12514,54 +14372,151 @@
               <a:buFontTx/>
               <a:buNone/>
             </a:pPr>
+            <a:r>
+              <a:rPr lang="ko-KR" sz="1800">
+                <a:latin typeface="맑은 고딕" charset="0"/>
+                <a:ea typeface="맑은 고딕" charset="0"/>
+              </a:rPr>
+              <a:t>특정한 위치에서 실행을 정지하고 Unity에 제어권을 돌려줍니다.</a:t>
+            </a:r>
             <a:endParaRPr lang="ko-KR" altLang="en-US" sz="1800">
               <a:latin typeface="맑은 고딕" charset="0"/>
               <a:ea typeface="맑은 고딕" charset="0"/>
             </a:endParaRPr>
           </a:p>
           <a:p>
-            <a:pPr marL="0" indent="0" algn="l" latinLnBrk="0" hangingPunct="1">
-              <a:buFontTx/>
-              <a:buNone/>
-            </a:pPr>
-            <a:r>
-              <a:rPr lang="ko-KR" sz="1800">
-                <a:latin typeface="맑은 고딕" charset="0"/>
-                <a:ea typeface="맑은 고딕" charset="0"/>
-              </a:rPr>
-              <a:t>원하는 컴포넌트</a:t>
-            </a:r>
-            <a:r>
-              <a:rPr lang="ko-KR" sz="1800">
-                <a:latin typeface="맑은 고딕" charset="0"/>
-                <a:ea typeface="맑은 고딕" charset="0"/>
-              </a:rPr>
-              <a:t>에 있는 속성을 사용하려면</a:t>
-            </a:r>
-            <a:r>
-              <a:rPr lang="ko-KR" sz="1800">
-                <a:latin typeface="맑은 고딕" charset="0"/>
-                <a:ea typeface="맑은 고딕" charset="0"/>
-              </a:rPr>
-              <a:t> </a:t>
-            </a:r>
-            <a:r>
-              <a:rPr lang="ko-KR" sz="1800">
-                <a:latin typeface="맑은 고딕" charset="0"/>
-                <a:ea typeface="맑은 고딕" charset="0"/>
-              </a:rPr>
-              <a:t>게임 오브젝트에 컴포넌트가 들어가 있어야 합니다.</a:t>
-            </a:r>
+            <a:pPr marL="0" indent="0" rtl="0" algn="l" defTabSz="914400" eaLnBrk="1" latinLnBrk="0" hangingPunct="1">
+              <a:buFontTx/>
+              <a:buNone/>
+            </a:pPr>
             <a:endParaRPr lang="ko-KR" altLang="en-US" sz="1800">
               <a:latin typeface="맑은 고딕" charset="0"/>
               <a:ea typeface="맑은 고딕" charset="0"/>
             </a:endParaRPr>
           </a:p>
+          <a:p>
+            <a:pPr marL="0" indent="0" rtl="0" algn="l" defTabSz="914400" eaLnBrk="1" latinLnBrk="0" hangingPunct="1">
+              <a:buFontTx/>
+              <a:buNone/>
+            </a:pPr>
+            <a:r>
+              <a:rPr lang="ko-KR" sz="1800">
+                <a:latin typeface="맑은 고딕" charset="0"/>
+                <a:ea typeface="맑은 고딕" charset="0"/>
+              </a:rPr>
+              <a:t>그다음 계속 실행할 때는 다음 프레임에서 실행을 멈춘 위치부터 실행을 계속할 수 있도록 진행해주는 함수입니다.</a:t>
+            </a:r>
+            <a:endParaRPr lang="ko-KR" altLang="en-US" sz="1800">
+              <a:latin typeface="맑은 고딕" charset="0"/>
+              <a:ea typeface="맑은 고딕" charset="0"/>
+            </a:endParaRPr>
+          </a:p>
+        </p:txBody>
+      </p:sp>
+      <p:sp>
+        <p:nvSpPr>
+          <p:cNvPr id="1061" name="Rect 0"/>
+          <p:cNvSpPr txBox="1">
+            <a:spLocks/>
+          </p:cNvSpPr>
+          <p:nvPr/>
+        </p:nvSpPr>
+        <p:spPr>
+          <a:xfrm rot="0">
+            <a:off x="6817995" y="4123055"/>
+            <a:ext cx="4105910" cy="2061845"/>
+          </a:xfrm>
+          <a:prstGeom prst="rect"/>
+          <a:noFill/>
+          <a:ln w="0">
+            <a:noFill/>
+            <a:prstDash/>
+          </a:ln>
+        </p:spPr>
+        <p:txBody>
+          <a:bodyPr wrap="square" lIns="89535" tIns="46355" rIns="89535" bIns="46355" numCol="1" vert="horz" anchor="t">
+            <a:spAutoFit/>
+          </a:bodyPr>
+          <a:lstStyle/>
+          <a:p>
+            <a:pPr marL="0" indent="0" rtl="0" algn="l" defTabSz="914400" eaLnBrk="1" latinLnBrk="0" hangingPunct="1">
+              <a:buFontTx/>
+              <a:buNone/>
+            </a:pPr>
+            <a:r>
+              <a:rPr lang="ko-KR" sz="2000" b="1">
+                <a:solidFill>
+                  <a:srgbClr val="0611F2"/>
+                </a:solidFill>
+                <a:latin typeface="맑은 고딕" charset="0"/>
+                <a:ea typeface="맑은 고딕" charset="0"/>
+              </a:rPr>
+              <a:t>1</a:t>
+            </a:r>
+            <a:r>
+              <a:rPr lang="ko-KR" sz="2000" b="1">
+                <a:solidFill>
+                  <a:srgbClr val="0611F2"/>
+                </a:solidFill>
+                <a:latin typeface="맑은 고딕" charset="0"/>
+                <a:ea typeface="맑은 고딕" charset="0"/>
+              </a:rPr>
+              <a:t>7</a:t>
+            </a:r>
+            <a:r>
+              <a:rPr sz="2000" b="1">
+                <a:solidFill>
+                  <a:srgbClr val="0611F2"/>
+                </a:solidFill>
+                <a:latin typeface="맑은 고딕" charset="0"/>
+                <a:ea typeface="맑은 고딕" charset="0"/>
+              </a:rPr>
+              <a:t>. </a:t>
+            </a:r>
+            <a:r>
+              <a:rPr lang="ko-KR" sz="1800">
+                <a:latin typeface="맑은 고딕" charset="0"/>
+                <a:ea typeface="맑은 고딕" charset="0"/>
+              </a:rPr>
+              <a:t>그다음 Various 스크립트에 Project 폴더에 있는 Texture에 Berries와 Pumkin 그리고 Tangerines 텍스처를 넣어줍니다.</a:t>
+            </a:r>
+            <a:endParaRPr lang="ko-KR" altLang="en-US" sz="1800">
+              <a:latin typeface="맑은 고딕" charset="0"/>
+              <a:ea typeface="맑은 고딕" charset="0"/>
+            </a:endParaRPr>
+          </a:p>
+          <a:p>
+            <a:pPr marL="0" indent="0" rtl="0" algn="l" defTabSz="914400" eaLnBrk="1" latinLnBrk="0" hangingPunct="1">
+              <a:buFontTx/>
+              <a:buNone/>
+            </a:pPr>
+            <a:endParaRPr lang="ko-KR" altLang="en-US" sz="1800">
+              <a:latin typeface="맑은 고딕" charset="0"/>
+              <a:ea typeface="맑은 고딕" charset="0"/>
+            </a:endParaRPr>
+          </a:p>
+          <a:p>
+            <a:pPr marL="0" indent="0" rtl="0" algn="l" defTabSz="914400" eaLnBrk="1" latinLnBrk="0" hangingPunct="1">
+              <a:buFontTx/>
+              <a:buNone/>
+            </a:pPr>
+            <a:r>
+              <a:rPr lang="ko-KR" sz="1800">
+                <a:latin typeface="맑은 고딕" charset="0"/>
+                <a:ea typeface="맑은 고딕" charset="0"/>
+              </a:rPr>
+              <a:t>그런 다음 이미지에는 State 오브젝트를 넣어줍니다. </a:t>
+            </a:r>
+            <a:endParaRPr lang="ko-KR" altLang="en-US" sz="1800">
+              <a:latin typeface="맑은 고딕" charset="0"/>
+              <a:ea typeface="맑은 고딕" charset="0"/>
+            </a:endParaRPr>
+          </a:p>
         </p:txBody>
       </p:sp>
       <p:pic>
         <p:nvPicPr>
-          <p:cNvPr id="1055" name="그림 93" descr="C:/Users/Admin1/AppData/Roaming/PolarisOffice/ETemp/17076_14861856/fImage41813882382.png"/>
+          <p:cNvPr id="1062" name="그림 5" descr="C:/Users/Admin1/AppData/Roaming/PolarisOffice/ETemp/18200_22907784/fImage121272878467.png"/>
           <p:cNvPicPr>
             <a:picLocks noChangeAspect="1"/>
           </p:cNvPicPr>
@@ -12581,8 +14536,8 @@
         </p:blipFill>
         <p:spPr>
           <a:xfrm rot="0">
-            <a:off x="6826250" y="1479550"/>
-            <a:ext cx="4032885" cy="1230630"/>
+            <a:off x="1392555" y="1475105"/>
+            <a:ext cx="3996055" cy="2209800"/>
           </a:xfrm>
           <a:prstGeom prst="roundRect"/>
           <a:solidFill>
@@ -12592,7 +14547,7 @@
       </p:pic>
       <p:pic>
         <p:nvPicPr>
-          <p:cNvPr id="1056" name="그림 97" descr="C:/Users/Admin1/AppData/Roaming/PolarisOffice/ETemp/17076_14861856/fImage521513897421.png"/>
+          <p:cNvPr id="1063" name="그림 8" descr="C:/Users/Admin1/AppData/Roaming/PolarisOffice/ETemp/18200_22907784/fImage155412886334.png"/>
           <p:cNvPicPr>
             <a:picLocks noChangeAspect="1"/>
           </p:cNvPicPr>
@@ -12612,8 +14567,8 @@
         </p:blipFill>
         <p:spPr>
           <a:xfrm rot="0">
-            <a:off x="1409700" y="1470660"/>
-            <a:ext cx="1977390" cy="2413635"/>
+            <a:off x="6815455" y="1487805"/>
+            <a:ext cx="4117340" cy="1245870"/>
           </a:xfrm>
           <a:prstGeom prst="roundRect"/>
           <a:solidFill>
@@ -12623,7 +14578,7 @@
       </p:pic>
       <p:pic>
         <p:nvPicPr>
-          <p:cNvPr id="1057" name="그림 100" descr="C:/Users/Admin1/AppData/Roaming/PolarisOffice/ETemp/17076_14861856/fImage4088163908716.png"/>
+          <p:cNvPr id="1064" name="그림 11" descr="C:/Users/Admin1/AppData/Roaming/PolarisOffice/ETemp/18200_22907784/fImage335502896500.png"/>
           <p:cNvPicPr>
             <a:picLocks noChangeAspect="1"/>
           </p:cNvPicPr>
@@ -12643,16 +14598,18 @@
         </p:blipFill>
         <p:spPr>
           <a:xfrm rot="0">
-            <a:off x="3937000" y="2042795"/>
-            <a:ext cx="1397635" cy="751840"/>
-          </a:xfrm>
-          <a:prstGeom prst="rect"/>
-          <a:noFill/>
+            <a:off x="8173085" y="2905760"/>
+            <a:ext cx="2764790" cy="1108075"/>
+          </a:xfrm>
+          <a:prstGeom prst="roundRect"/>
+          <a:solidFill>
+            <a:srgbClr val="EDEDED"/>
+          </a:solidFill>
         </p:spPr>
       </p:pic>
       <p:pic>
         <p:nvPicPr>
-          <p:cNvPr id="1058" name="그림 101" descr="C:/Users/Admin1/AppData/Roaming/PolarisOffice/ETemp/17076_14861856/fImage1437533919718.png"/>
+          <p:cNvPr id="1065" name="그림 14" descr="C:/Users/Admin1/AppData/Roaming/PolarisOffice/ETemp/18200_22907784/fImage65252909169.png"/>
           <p:cNvPicPr>
             <a:picLocks noChangeAspect="1"/>
           </p:cNvPicPr>
@@ -12672,13 +14629,147 @@
         </p:blipFill>
         <p:spPr>
           <a:xfrm rot="0">
-            <a:off x="3164205" y="2317750"/>
-            <a:ext cx="688975" cy="392430"/>
-          </a:xfrm>
-          <a:prstGeom prst="rect"/>
-          <a:noFill/>
+            <a:off x="6815455" y="2895600"/>
+            <a:ext cx="1193800" cy="1109345"/>
+          </a:xfrm>
+          <a:prstGeom prst="roundRect"/>
+          <a:solidFill>
+            <a:srgbClr val="EDEDED"/>
+          </a:solidFill>
         </p:spPr>
       </p:pic>
+      <p:cxnSp>
+        <p:nvCxnSpPr>
+          <p:cNvPr id="1066" name="도형 17"/>
+          <p:cNvCxnSpPr/>
+          <p:nvPr/>
+        </p:nvCxnSpPr>
+        <p:spPr>
+          <a:xfrm rot="0" flipV="1">
+            <a:off x="8769985" y="2334895"/>
+            <a:ext cx="2059305" cy="805180"/>
+          </a:xfrm>
+          <a:prstGeom prst="straightConnector1"/>
+          <a:ln w="6350" cap="flat" cmpd="sng">
+            <a:prstDash/>
+            <a:headEnd type="none" w="med" len="med"/>
+            <a:tailEnd type="triangle" w="med" len="med"/>
+          </a:ln>
+        </p:spPr>
+        <p:style>
+          <a:lnRef idx="1">
+            <a:schemeClr val="accent1"/>
+          </a:lnRef>
+          <a:fillRef idx="0">
+            <a:schemeClr val="accent1"/>
+          </a:fillRef>
+          <a:effectRef idx="0">
+            <a:schemeClr val="accent1"/>
+          </a:effectRef>
+          <a:fontRef idx="minor">
+            <a:schemeClr val="tx1"/>
+          </a:fontRef>
+        </p:style>
+      </p:cxnSp>
+      <p:cxnSp>
+        <p:nvCxnSpPr>
+          <p:cNvPr id="1067" name="도형 18"/>
+          <p:cNvCxnSpPr/>
+          <p:nvPr/>
+        </p:nvCxnSpPr>
+        <p:spPr>
+          <a:xfrm rot="0" flipV="1">
+            <a:off x="10283190" y="2482215"/>
+            <a:ext cx="554355" cy="666750"/>
+          </a:xfrm>
+          <a:prstGeom prst="straightConnector1"/>
+          <a:ln w="6350" cap="flat" cmpd="sng">
+            <a:prstDash/>
+            <a:headEnd type="none" w="med" len="med"/>
+            <a:tailEnd type="triangle" w="med" len="med"/>
+          </a:ln>
+        </p:spPr>
+        <p:style>
+          <a:lnRef idx="1">
+            <a:schemeClr val="accent1"/>
+          </a:lnRef>
+          <a:fillRef idx="0">
+            <a:schemeClr val="accent1"/>
+          </a:fillRef>
+          <a:effectRef idx="0">
+            <a:schemeClr val="accent1"/>
+          </a:effectRef>
+          <a:fontRef idx="minor">
+            <a:schemeClr val="tx1"/>
+          </a:fontRef>
+        </p:style>
+      </p:cxnSp>
+      <p:cxnSp>
+        <p:nvCxnSpPr>
+          <p:cNvPr id="1068" name="도형 19"/>
+          <p:cNvCxnSpPr/>
+          <p:nvPr/>
+        </p:nvCxnSpPr>
+        <p:spPr>
+          <a:xfrm rot="0" flipV="1">
+            <a:off x="10681335" y="2637790"/>
+            <a:ext cx="156210" cy="511175"/>
+          </a:xfrm>
+          <a:prstGeom prst="straightConnector1"/>
+          <a:ln w="6350" cap="flat" cmpd="sng">
+            <a:prstDash/>
+            <a:headEnd type="none" w="med" len="med"/>
+            <a:tailEnd type="triangle" w="med" len="med"/>
+          </a:ln>
+        </p:spPr>
+        <p:style>
+          <a:lnRef idx="1">
+            <a:schemeClr val="accent1"/>
+          </a:lnRef>
+          <a:fillRef idx="0">
+            <a:schemeClr val="accent1"/>
+          </a:fillRef>
+          <a:effectRef idx="0">
+            <a:schemeClr val="accent1"/>
+          </a:effectRef>
+          <a:fontRef idx="minor">
+            <a:schemeClr val="tx1"/>
+          </a:fontRef>
+        </p:style>
+      </p:cxnSp>
+      <p:cxnSp>
+        <p:nvCxnSpPr>
+          <p:cNvPr id="1069" name="도형 20"/>
+          <p:cNvCxnSpPr/>
+          <p:nvPr/>
+        </p:nvCxnSpPr>
+        <p:spPr>
+          <a:xfrm rot="0" flipV="1">
+            <a:off x="7619365" y="1885315"/>
+            <a:ext cx="3235325" cy="1678940"/>
+          </a:xfrm>
+          <a:prstGeom prst="straightConnector1"/>
+          <a:ln w="6350" cap="flat" cmpd="sng">
+            <a:prstDash/>
+            <a:headEnd type="none" w="med" len="med"/>
+            <a:tailEnd type="triangle" w="med" len="med"/>
+          </a:ln>
+        </p:spPr>
+        <p:style>
+          <a:lnRef idx="1">
+            <a:schemeClr val="accent1"/>
+          </a:lnRef>
+          <a:fillRef idx="0">
+            <a:schemeClr val="accent1"/>
+          </a:fillRef>
+          <a:effectRef idx="0">
+            <a:schemeClr val="accent1"/>
+          </a:effectRef>
+          <a:fontRef idx="minor">
+            <a:schemeClr val="tx1"/>
+          </a:fontRef>
+        </p:style>
+      </p:cxnSp>
     </p:spTree>
   </p:cSld>
   <p:clrMapOvr>

</xml_diff>